<commit_message>
Name and additional animations
My name has been added to the first slide. Additional animations for the
"An Initial Approach" have been added.
</commit_message>
<xml_diff>
--- a/FeaturesVsLayers.pptx
+++ b/FeaturesVsLayers.pptx
@@ -5177,7 +5177,255 @@
       </p:sp>
       <p:sp>
         <p:nvSpPr>
-          <p:cNvPr id="3" name="Subtitle 2"/>
+          <p:cNvPr id="6" name="Name"/>
+          <p:cNvSpPr txBox="1">
+            <a:spLocks/>
+          </p:cNvSpPr>
+          <p:nvPr/>
+        </p:nvSpPr>
+        <p:spPr>
+          <a:xfrm>
+            <a:off x="1322921" y="3299011"/>
+            <a:ext cx="6498159" cy="916641"/>
+          </a:xfrm>
+          <a:prstGeom prst="rect">
+            <a:avLst/>
+          </a:prstGeom>
+        </p:spPr>
+        <p:txBody>
+          <a:bodyPr vert="horz" lIns="91440" tIns="45720" rIns="91440" bIns="45720" rtlCol="0">
+            <a:normAutofit/>
+          </a:bodyPr>
+          <a:lstStyle>
+            <a:lvl1pPr marL="0" indent="0" algn="ctr" defTabSz="914400" rtl="0" eaLnBrk="1" latinLnBrk="0" hangingPunct="1">
+              <a:spcBef>
+                <a:spcPts val="300"/>
+              </a:spcBef>
+              <a:buClr>
+                <a:schemeClr val="accent1">
+                  <a:lumMod val="60000"/>
+                  <a:lumOff val="40000"/>
+                </a:schemeClr>
+              </a:buClr>
+              <a:buSzPct val="110000"/>
+              <a:buFont typeface="Wingdings 2" pitchFamily="18" charset="2"/>
+              <a:buNone/>
+              <a:defRPr sz="1800" kern="1200">
+                <a:solidFill>
+                  <a:schemeClr val="tx1">
+                    <a:tint val="75000"/>
+                  </a:schemeClr>
+                </a:solidFill>
+                <a:latin typeface="+mn-lt"/>
+                <a:ea typeface="+mn-ea"/>
+                <a:cs typeface="+mn-cs"/>
+              </a:defRPr>
+            </a:lvl1pPr>
+            <a:lvl2pPr marL="457200" indent="0" algn="ctr" defTabSz="914400" rtl="0" eaLnBrk="1" latinLnBrk="0" hangingPunct="1">
+              <a:spcBef>
+                <a:spcPts val="600"/>
+              </a:spcBef>
+              <a:buClr>
+                <a:schemeClr val="accent1">
+                  <a:lumMod val="75000"/>
+                </a:schemeClr>
+              </a:buClr>
+              <a:buSzPct val="110000"/>
+              <a:buFont typeface="Wingdings 2" pitchFamily="18" charset="2"/>
+              <a:buNone/>
+              <a:defRPr sz="2200" kern="1200">
+                <a:solidFill>
+                  <a:schemeClr val="tx1">
+                    <a:tint val="75000"/>
+                  </a:schemeClr>
+                </a:solidFill>
+                <a:latin typeface="+mn-lt"/>
+                <a:ea typeface="+mn-ea"/>
+                <a:cs typeface="+mn-cs"/>
+              </a:defRPr>
+            </a:lvl2pPr>
+            <a:lvl3pPr marL="914400" indent="0" algn="ctr" defTabSz="914400" rtl="0" eaLnBrk="1" latinLnBrk="0" hangingPunct="1">
+              <a:spcBef>
+                <a:spcPts val="600"/>
+              </a:spcBef>
+              <a:buClr>
+                <a:schemeClr val="accent1">
+                  <a:lumMod val="60000"/>
+                  <a:lumOff val="40000"/>
+                </a:schemeClr>
+              </a:buClr>
+              <a:buSzPct val="110000"/>
+              <a:buFont typeface="Wingdings 2" pitchFamily="18" charset="2"/>
+              <a:buNone/>
+              <a:defRPr sz="2000" kern="1200">
+                <a:solidFill>
+                  <a:schemeClr val="tx1">
+                    <a:tint val="75000"/>
+                  </a:schemeClr>
+                </a:solidFill>
+                <a:latin typeface="+mn-lt"/>
+                <a:ea typeface="+mn-ea"/>
+                <a:cs typeface="+mn-cs"/>
+              </a:defRPr>
+            </a:lvl3pPr>
+            <a:lvl4pPr marL="1371600" indent="0" algn="ctr" defTabSz="914400" rtl="0" eaLnBrk="1" latinLnBrk="0" hangingPunct="1">
+              <a:spcBef>
+                <a:spcPts val="600"/>
+              </a:spcBef>
+              <a:buClr>
+                <a:schemeClr val="accent1">
+                  <a:lumMod val="75000"/>
+                </a:schemeClr>
+              </a:buClr>
+              <a:buSzPct val="110000"/>
+              <a:buFont typeface="Wingdings 2" pitchFamily="18" charset="2"/>
+              <a:buNone/>
+              <a:defRPr sz="1800" kern="1200">
+                <a:solidFill>
+                  <a:schemeClr val="tx1">
+                    <a:tint val="75000"/>
+                  </a:schemeClr>
+                </a:solidFill>
+                <a:latin typeface="+mn-lt"/>
+                <a:ea typeface="+mn-ea"/>
+                <a:cs typeface="+mn-cs"/>
+              </a:defRPr>
+            </a:lvl4pPr>
+            <a:lvl5pPr marL="1828800" indent="0" algn="ctr" defTabSz="914400" rtl="0" eaLnBrk="1" latinLnBrk="0" hangingPunct="1">
+              <a:spcBef>
+                <a:spcPts val="600"/>
+              </a:spcBef>
+              <a:buClr>
+                <a:schemeClr val="accent1">
+                  <a:lumMod val="60000"/>
+                  <a:lumOff val="40000"/>
+                </a:schemeClr>
+              </a:buClr>
+              <a:buSzPct val="110000"/>
+              <a:buFont typeface="Wingdings 2" pitchFamily="18" charset="2"/>
+              <a:buNone/>
+              <a:defRPr sz="1800" kern="1200">
+                <a:solidFill>
+                  <a:schemeClr val="tx1">
+                    <a:tint val="75000"/>
+                  </a:schemeClr>
+                </a:solidFill>
+                <a:latin typeface="+mn-lt"/>
+                <a:ea typeface="+mn-ea"/>
+                <a:cs typeface="+mn-cs"/>
+              </a:defRPr>
+            </a:lvl5pPr>
+            <a:lvl6pPr marL="2286000" indent="0" algn="ctr" defTabSz="914400" rtl="0" eaLnBrk="1" latinLnBrk="0" hangingPunct="1">
+              <a:spcBef>
+                <a:spcPct val="20000"/>
+              </a:spcBef>
+              <a:buClr>
+                <a:schemeClr val="accent2"/>
+              </a:buClr>
+              <a:buSzPct val="110000"/>
+              <a:buFont typeface="Wingdings 2" pitchFamily="18" charset="2"/>
+              <a:buNone/>
+              <a:defRPr lang="en-US" sz="1800" kern="1200">
+                <a:solidFill>
+                  <a:schemeClr val="tx1">
+                    <a:tint val="75000"/>
+                  </a:schemeClr>
+                </a:solidFill>
+                <a:latin typeface="+mn-lt"/>
+                <a:ea typeface="+mn-ea"/>
+                <a:cs typeface="+mn-cs"/>
+              </a:defRPr>
+            </a:lvl6pPr>
+            <a:lvl7pPr marL="2743200" indent="0" algn="ctr" defTabSz="914400" rtl="0" eaLnBrk="1" latinLnBrk="0" hangingPunct="1">
+              <a:spcBef>
+                <a:spcPct val="20000"/>
+              </a:spcBef>
+              <a:buClr>
+                <a:schemeClr val="accent1">
+                  <a:lumMod val="60000"/>
+                  <a:lumOff val="40000"/>
+                </a:schemeClr>
+              </a:buClr>
+              <a:buSzPct val="110000"/>
+              <a:buFont typeface="Wingdings 2" pitchFamily="18" charset="2"/>
+              <a:buNone/>
+              <a:defRPr lang="en-US" sz="1800" kern="1200">
+                <a:solidFill>
+                  <a:schemeClr val="tx1">
+                    <a:tint val="75000"/>
+                  </a:schemeClr>
+                </a:solidFill>
+                <a:latin typeface="+mn-lt"/>
+                <a:ea typeface="+mn-ea"/>
+                <a:cs typeface="+mn-cs"/>
+              </a:defRPr>
+            </a:lvl7pPr>
+            <a:lvl8pPr marL="3200400" indent="0" algn="ctr" defTabSz="914400" rtl="0" eaLnBrk="1" latinLnBrk="0" hangingPunct="1">
+              <a:spcBef>
+                <a:spcPct val="20000"/>
+              </a:spcBef>
+              <a:buClr>
+                <a:schemeClr val="accent2"/>
+              </a:buClr>
+              <a:buSzPct val="110000"/>
+              <a:buFont typeface="Wingdings 2" pitchFamily="18" charset="2"/>
+              <a:buNone/>
+              <a:defRPr lang="en-US" sz="1800" kern="1200">
+                <a:solidFill>
+                  <a:schemeClr val="tx1">
+                    <a:tint val="75000"/>
+                  </a:schemeClr>
+                </a:solidFill>
+                <a:latin typeface="+mn-lt"/>
+                <a:ea typeface="+mn-ea"/>
+                <a:cs typeface="+mn-cs"/>
+              </a:defRPr>
+            </a:lvl8pPr>
+            <a:lvl9pPr marL="3657600" indent="0" algn="ctr" defTabSz="914400" rtl="0" eaLnBrk="1" latinLnBrk="0" hangingPunct="1">
+              <a:spcBef>
+                <a:spcPct val="20000"/>
+              </a:spcBef>
+              <a:buClr>
+                <a:schemeClr val="accent1">
+                  <a:lumMod val="60000"/>
+                  <a:lumOff val="40000"/>
+                </a:schemeClr>
+              </a:buClr>
+              <a:buSzPct val="110000"/>
+              <a:buFont typeface="Wingdings 2" pitchFamily="18" charset="2"/>
+              <a:buNone/>
+              <a:defRPr lang="en-US" sz="1800" kern="1200">
+                <a:solidFill>
+                  <a:schemeClr val="tx1">
+                    <a:tint val="75000"/>
+                  </a:schemeClr>
+                </a:solidFill>
+                <a:latin typeface="+mn-lt"/>
+                <a:ea typeface="+mn-ea"/>
+                <a:cs typeface="+mn-cs"/>
+              </a:defRPr>
+            </a:lvl9pPr>
+          </a:lstStyle>
+          <a:p>
+            <a:r>
+              <a:rPr lang="en-US" dirty="0" smtClean="0"/>
+              <a:t>Jorge </a:t>
+            </a:r>
+            <a:r>
+              <a:rPr lang="en-US" dirty="0" err="1" smtClean="0"/>
+              <a:t>Gueorguiev</a:t>
+            </a:r>
+            <a:r>
+              <a:rPr lang="en-US" dirty="0" smtClean="0"/>
+              <a:t> Garcia</a:t>
+            </a:r>
+            <a:endParaRPr lang="en-US" dirty="0"/>
+          </a:p>
+        </p:txBody>
+      </p:sp>
+      <p:sp>
+        <p:nvSpPr>
+          <p:cNvPr id="3" name="By Me"/>
           <p:cNvSpPr>
             <a:spLocks noGrp="1"/>
           </p:cNvSpPr>
@@ -5192,7 +5440,11 @@
           <a:p>
             <a:r>
               <a:rPr lang="en-US" dirty="0" smtClean="0"/>
-              <a:t>By me</a:t>
+              <a:t>By </a:t>
+            </a:r>
+            <a:r>
+              <a:rPr lang="en-US" dirty="0" smtClean="0"/>
+              <a:t>me</a:t>
             </a:r>
             <a:endParaRPr lang="en-US" dirty="0"/>
           </a:p>
@@ -5208,6 +5460,331 @@
   <p:clrMapOvr>
     <a:masterClrMapping/>
   </p:clrMapOvr>
+  <p:timing>
+    <p:tnLst>
+      <p:par>
+        <p:cTn id="1" dur="indefinite" restart="never" nodeType="tmRoot">
+          <p:childTnLst>
+            <p:seq concurrent="1" nextAc="seek">
+              <p:cTn id="2" dur="indefinite" nodeType="mainSeq">
+                <p:childTnLst>
+                  <p:par>
+                    <p:cTn id="3" fill="hold">
+                      <p:stCondLst>
+                        <p:cond delay="indefinite"/>
+                      </p:stCondLst>
+                      <p:childTnLst>
+                        <p:par>
+                          <p:cTn id="4" fill="hold">
+                            <p:stCondLst>
+                              <p:cond delay="0"/>
+                            </p:stCondLst>
+                            <p:childTnLst>
+                              <p:par>
+                                <p:cTn id="5" presetID="45" presetClass="entr" presetSubtype="0" fill="hold" grpId="0" nodeType="clickEffect">
+                                  <p:stCondLst>
+                                    <p:cond delay="0"/>
+                                  </p:stCondLst>
+                                  <p:childTnLst>
+                                    <p:set>
+                                      <p:cBhvr>
+                                        <p:cTn id="6" dur="1" fill="hold">
+                                          <p:stCondLst>
+                                            <p:cond delay="0"/>
+                                          </p:stCondLst>
+                                        </p:cTn>
+                                        <p:tgtEl>
+                                          <p:spTgt spid="6"/>
+                                        </p:tgtEl>
+                                        <p:attrNameLst>
+                                          <p:attrName>style.visibility</p:attrName>
+                                        </p:attrNameLst>
+                                      </p:cBhvr>
+                                      <p:to>
+                                        <p:strVal val="visible"/>
+                                      </p:to>
+                                    </p:set>
+                                    <p:animEffect transition="in" filter="fade">
+                                      <p:cBhvr>
+                                        <p:cTn id="7" dur="1000"/>
+                                        <p:tgtEl>
+                                          <p:spTgt spid="6"/>
+                                        </p:tgtEl>
+                                      </p:cBhvr>
+                                    </p:animEffect>
+                                    <p:anim calcmode="lin" valueType="num">
+                                      <p:cBhvr>
+                                        <p:cTn id="8" dur="1000" fill="hold"/>
+                                        <p:tgtEl>
+                                          <p:spTgt spid="6"/>
+                                        </p:tgtEl>
+                                        <p:attrNameLst>
+                                          <p:attrName>ppt_w</p:attrName>
+                                        </p:attrNameLst>
+                                      </p:cBhvr>
+                                      <p:tavLst>
+                                        <p:tav tm="0" fmla="#ppt_w*sin(2.5*pi*$)">
+                                          <p:val>
+                                            <p:fltVal val="0"/>
+                                          </p:val>
+                                        </p:tav>
+                                        <p:tav tm="100000">
+                                          <p:val>
+                                            <p:fltVal val="1"/>
+                                          </p:val>
+                                        </p:tav>
+                                      </p:tavLst>
+                                    </p:anim>
+                                    <p:anim calcmode="lin" valueType="num">
+                                      <p:cBhvr>
+                                        <p:cTn id="9" dur="1000" fill="hold"/>
+                                        <p:tgtEl>
+                                          <p:spTgt spid="6"/>
+                                        </p:tgtEl>
+                                        <p:attrNameLst>
+                                          <p:attrName>ppt_h</p:attrName>
+                                        </p:attrNameLst>
+                                      </p:cBhvr>
+                                      <p:tavLst>
+                                        <p:tav tm="0">
+                                          <p:val>
+                                            <p:strVal val="#ppt_h"/>
+                                          </p:val>
+                                        </p:tav>
+                                        <p:tav tm="100000">
+                                          <p:val>
+                                            <p:strVal val="#ppt_h"/>
+                                          </p:val>
+                                        </p:tav>
+                                      </p:tavLst>
+                                    </p:anim>
+                                  </p:childTnLst>
+                                </p:cTn>
+                              </p:par>
+                              <p:par>
+                                <p:cTn id="10" presetID="45" presetClass="exit" presetSubtype="0" fill="hold" grpId="0" nodeType="withEffect">
+                                  <p:stCondLst>
+                                    <p:cond delay="0"/>
+                                  </p:stCondLst>
+                                  <p:childTnLst>
+                                    <p:animEffect transition="out" filter="fade">
+                                      <p:cBhvr>
+                                        <p:cTn id="11" dur="1000"/>
+                                        <p:tgtEl>
+                                          <p:spTgt spid="3">
+                                            <p:txEl>
+                                              <p:pRg st="0" end="0"/>
+                                            </p:txEl>
+                                          </p:spTgt>
+                                        </p:tgtEl>
+                                      </p:cBhvr>
+                                    </p:animEffect>
+                                    <p:anim calcmode="lin" valueType="num">
+                                      <p:cBhvr>
+                                        <p:cTn id="12" dur="1000"/>
+                                        <p:tgtEl>
+                                          <p:spTgt spid="3">
+                                            <p:txEl>
+                                              <p:pRg st="0" end="0"/>
+                                            </p:txEl>
+                                          </p:spTgt>
+                                        </p:tgtEl>
+                                        <p:attrNameLst>
+                                          <p:attrName>ppt_w</p:attrName>
+                                        </p:attrNameLst>
+                                      </p:cBhvr>
+                                      <p:tavLst>
+                                        <p:tav tm="0">
+                                          <p:val>
+                                            <p:strVal val="ppt_w"/>
+                                          </p:val>
+                                        </p:tav>
+                                        <p:tav tm="5000">
+                                          <p:val>
+                                            <p:strVal val="0.92*ppt_w"/>
+                                          </p:val>
+                                        </p:tav>
+                                        <p:tav tm="10000">
+                                          <p:val>
+                                            <p:strVal val="0.71*ppt_w"/>
+                                          </p:val>
+                                        </p:tav>
+                                        <p:tav tm="15000">
+                                          <p:val>
+                                            <p:strVal val="0.38*ppt_w"/>
+                                          </p:val>
+                                        </p:tav>
+                                        <p:tav tm="20000">
+                                          <p:val>
+                                            <p:fltVal val="0"/>
+                                          </p:val>
+                                        </p:tav>
+                                        <p:tav tm="25000">
+                                          <p:val>
+                                            <p:strVal val="-0.38*ppt_w"/>
+                                          </p:val>
+                                        </p:tav>
+                                        <p:tav tm="30000">
+                                          <p:val>
+                                            <p:strVal val="-0.71*ppt_w"/>
+                                          </p:val>
+                                        </p:tav>
+                                        <p:tav tm="35000">
+                                          <p:val>
+                                            <p:strVal val="-0.92*ppt_w"/>
+                                          </p:val>
+                                        </p:tav>
+                                        <p:tav tm="40000">
+                                          <p:val>
+                                            <p:strVal val="-ppt_w"/>
+                                          </p:val>
+                                        </p:tav>
+                                        <p:tav tm="45000">
+                                          <p:val>
+                                            <p:strVal val="-0.92*ppt_w"/>
+                                          </p:val>
+                                        </p:tav>
+                                        <p:tav tm="50000">
+                                          <p:val>
+                                            <p:strVal val="-0.71*ppt_w"/>
+                                          </p:val>
+                                        </p:tav>
+                                        <p:tav tm="55000">
+                                          <p:val>
+                                            <p:strVal val="-0.38*ppt_w"/>
+                                          </p:val>
+                                        </p:tav>
+                                        <p:tav tm="60000">
+                                          <p:val>
+                                            <p:fltVal val="0"/>
+                                          </p:val>
+                                        </p:tav>
+                                        <p:tav tm="65000">
+                                          <p:val>
+                                            <p:strVal val="0.38*ppt_w"/>
+                                          </p:val>
+                                        </p:tav>
+                                        <p:tav tm="70000">
+                                          <p:val>
+                                            <p:strVal val="0.71*ppt_w"/>
+                                          </p:val>
+                                        </p:tav>
+                                        <p:tav tm="75000">
+                                          <p:val>
+                                            <p:strVal val="0.92*ppt_w"/>
+                                          </p:val>
+                                        </p:tav>
+                                        <p:tav tm="80000">
+                                          <p:val>
+                                            <p:strVal val="ppt_w"/>
+                                          </p:val>
+                                        </p:tav>
+                                        <p:tav tm="85000">
+                                          <p:val>
+                                            <p:strVal val="0.92*ppt_w"/>
+                                          </p:val>
+                                        </p:tav>
+                                        <p:tav tm="90000">
+                                          <p:val>
+                                            <p:strVal val="0.71*ppt_w"/>
+                                          </p:val>
+                                        </p:tav>
+                                        <p:tav tm="95000">
+                                          <p:val>
+                                            <p:strVal val="0.38*ppt_w"/>
+                                          </p:val>
+                                        </p:tav>
+                                        <p:tav tm="100000">
+                                          <p:val>
+                                            <p:fltVal val="0"/>
+                                          </p:val>
+                                        </p:tav>
+                                      </p:tavLst>
+                                    </p:anim>
+                                    <p:anim calcmode="lin" valueType="num">
+                                      <p:cBhvr>
+                                        <p:cTn id="13" dur="1000"/>
+                                        <p:tgtEl>
+                                          <p:spTgt spid="3">
+                                            <p:txEl>
+                                              <p:pRg st="0" end="0"/>
+                                            </p:txEl>
+                                          </p:spTgt>
+                                        </p:tgtEl>
+                                        <p:attrNameLst>
+                                          <p:attrName>ppt_h</p:attrName>
+                                        </p:attrNameLst>
+                                      </p:cBhvr>
+                                      <p:tavLst>
+                                        <p:tav tm="0">
+                                          <p:val>
+                                            <p:strVal val="ppt_h"/>
+                                          </p:val>
+                                        </p:tav>
+                                        <p:tav tm="100000">
+                                          <p:val>
+                                            <p:strVal val="ppt_h"/>
+                                          </p:val>
+                                        </p:tav>
+                                      </p:tavLst>
+                                    </p:anim>
+                                    <p:set>
+                                      <p:cBhvr>
+                                        <p:cTn id="14" dur="1" fill="hold">
+                                          <p:stCondLst>
+                                            <p:cond delay="999"/>
+                                          </p:stCondLst>
+                                        </p:cTn>
+                                        <p:tgtEl>
+                                          <p:spTgt spid="3">
+                                            <p:txEl>
+                                              <p:pRg st="0" end="0"/>
+                                            </p:txEl>
+                                          </p:spTgt>
+                                        </p:tgtEl>
+                                        <p:attrNameLst>
+                                          <p:attrName>style.visibility</p:attrName>
+                                        </p:attrNameLst>
+                                      </p:cBhvr>
+                                      <p:to>
+                                        <p:strVal val="hidden"/>
+                                      </p:to>
+                                    </p:set>
+                                  </p:childTnLst>
+                                </p:cTn>
+                              </p:par>
+                            </p:childTnLst>
+                          </p:cTn>
+                        </p:par>
+                      </p:childTnLst>
+                    </p:cTn>
+                  </p:par>
+                </p:childTnLst>
+              </p:cTn>
+              <p:prevCondLst>
+                <p:cond evt="onPrev" delay="0">
+                  <p:tgtEl>
+                    <p:sldTgt/>
+                  </p:tgtEl>
+                </p:cond>
+              </p:prevCondLst>
+              <p:nextCondLst>
+                <p:cond evt="onNext" delay="0">
+                  <p:tgtEl>
+                    <p:sldTgt/>
+                  </p:tgtEl>
+                </p:cond>
+              </p:nextCondLst>
+            </p:seq>
+          </p:childTnLst>
+        </p:cTn>
+      </p:par>
+    </p:tnLst>
+    <p:bldLst>
+      <p:bldP spid="6" grpId="0"/>
+      <p:bldP spid="3" grpId="0" build="p"/>
+    </p:bldLst>
+  </p:timing>
 </p:sld>
 </file>
 
@@ -6381,6 +6958,90 @@
           </a:prstGeom>
         </p:spPr>
       </p:pic>
+      <p:sp>
+        <p:nvSpPr>
+          <p:cNvPr id="13" name="Mantain"/>
+          <p:cNvSpPr/>
+          <p:nvPr/>
+        </p:nvSpPr>
+        <p:spPr>
+          <a:xfrm rot="21084633">
+            <a:off x="5296808" y="1379218"/>
+            <a:ext cx="3294743" cy="2496457"/>
+          </a:xfrm>
+          <a:prstGeom prst="irregularSeal2">
+            <a:avLst/>
+          </a:prstGeom>
+        </p:spPr>
+        <p:style>
+          <a:lnRef idx="1">
+            <a:schemeClr val="accent6"/>
+          </a:lnRef>
+          <a:fillRef idx="3">
+            <a:schemeClr val="accent6"/>
+          </a:fillRef>
+          <a:effectRef idx="2">
+            <a:schemeClr val="accent6"/>
+          </a:effectRef>
+          <a:fontRef idx="minor">
+            <a:schemeClr val="lt1"/>
+          </a:fontRef>
+        </p:style>
+        <p:txBody>
+          <a:bodyPr rtlCol="0" anchor="ctr"/>
+          <a:lstStyle/>
+          <a:p>
+            <a:pPr algn="ctr"/>
+            <a:r>
+              <a:rPr lang="en-GB" dirty="0" smtClean="0"/>
+              <a:t>Maintain</a:t>
+            </a:r>
+            <a:endParaRPr lang="en-US" dirty="0"/>
+          </a:p>
+        </p:txBody>
+      </p:sp>
+      <p:sp>
+        <p:nvSpPr>
+          <p:cNvPr id="11" name="Change"/>
+          <p:cNvSpPr/>
+          <p:nvPr/>
+        </p:nvSpPr>
+        <p:spPr>
+          <a:xfrm rot="219727">
+            <a:off x="5296807" y="2912356"/>
+            <a:ext cx="3294743" cy="2496457"/>
+          </a:xfrm>
+          <a:prstGeom prst="irregularSeal2">
+            <a:avLst/>
+          </a:prstGeom>
+        </p:spPr>
+        <p:style>
+          <a:lnRef idx="1">
+            <a:schemeClr val="accent3"/>
+          </a:lnRef>
+          <a:fillRef idx="3">
+            <a:schemeClr val="accent3"/>
+          </a:fillRef>
+          <a:effectRef idx="2">
+            <a:schemeClr val="accent3"/>
+          </a:effectRef>
+          <a:fontRef idx="minor">
+            <a:schemeClr val="lt1"/>
+          </a:fontRef>
+        </p:style>
+        <p:txBody>
+          <a:bodyPr rtlCol="0" anchor="ctr"/>
+          <a:lstStyle/>
+          <a:p>
+            <a:pPr algn="ctr"/>
+            <a:r>
+              <a:rPr lang="en-GB" dirty="0" smtClean="0"/>
+              <a:t>Change</a:t>
+            </a:r>
+            <a:endParaRPr lang="en-US" dirty="0"/>
+          </a:p>
+        </p:txBody>
+      </p:sp>
     </p:spTree>
     <p:extLst>
       <p:ext uri="{BB962C8B-B14F-4D97-AF65-F5344CB8AC3E}">
@@ -6695,7 +7356,7 @@
                             </p:stCondLst>
                             <p:childTnLst>
                               <p:par>
-                                <p:cTn id="29" presetID="1" presetClass="entr" presetSubtype="0" fill="hold" nodeType="clickEffect">
+                                <p:cTn id="29" presetID="31" presetClass="entr" presetSubtype="0" fill="hold" grpId="0" nodeType="clickEffect">
                                   <p:stCondLst>
                                     <p:cond delay="0"/>
                                   </p:stCondLst>
@@ -6703,6 +7364,250 @@
                                     <p:set>
                                       <p:cBhvr>
                                         <p:cTn id="30" dur="1" fill="hold">
+                                          <p:stCondLst>
+                                            <p:cond delay="0"/>
+                                          </p:stCondLst>
+                                        </p:cTn>
+                                        <p:tgtEl>
+                                          <p:spTgt spid="13"/>
+                                        </p:tgtEl>
+                                        <p:attrNameLst>
+                                          <p:attrName>style.visibility</p:attrName>
+                                        </p:attrNameLst>
+                                      </p:cBhvr>
+                                      <p:to>
+                                        <p:strVal val="visible"/>
+                                      </p:to>
+                                    </p:set>
+                                    <p:anim calcmode="lin" valueType="num">
+                                      <p:cBhvr>
+                                        <p:cTn id="31" dur="1000" fill="hold"/>
+                                        <p:tgtEl>
+                                          <p:spTgt spid="13"/>
+                                        </p:tgtEl>
+                                        <p:attrNameLst>
+                                          <p:attrName>ppt_w</p:attrName>
+                                        </p:attrNameLst>
+                                      </p:cBhvr>
+                                      <p:tavLst>
+                                        <p:tav tm="0">
+                                          <p:val>
+                                            <p:fltVal val="0"/>
+                                          </p:val>
+                                        </p:tav>
+                                        <p:tav tm="100000">
+                                          <p:val>
+                                            <p:strVal val="#ppt_w"/>
+                                          </p:val>
+                                        </p:tav>
+                                      </p:tavLst>
+                                    </p:anim>
+                                    <p:anim calcmode="lin" valueType="num">
+                                      <p:cBhvr>
+                                        <p:cTn id="32" dur="1000" fill="hold"/>
+                                        <p:tgtEl>
+                                          <p:spTgt spid="13"/>
+                                        </p:tgtEl>
+                                        <p:attrNameLst>
+                                          <p:attrName>ppt_h</p:attrName>
+                                        </p:attrNameLst>
+                                      </p:cBhvr>
+                                      <p:tavLst>
+                                        <p:tav tm="0">
+                                          <p:val>
+                                            <p:fltVal val="0"/>
+                                          </p:val>
+                                        </p:tav>
+                                        <p:tav tm="100000">
+                                          <p:val>
+                                            <p:strVal val="#ppt_h"/>
+                                          </p:val>
+                                        </p:tav>
+                                      </p:tavLst>
+                                    </p:anim>
+                                    <p:anim calcmode="lin" valueType="num">
+                                      <p:cBhvr>
+                                        <p:cTn id="33" dur="1000" fill="hold"/>
+                                        <p:tgtEl>
+                                          <p:spTgt spid="13"/>
+                                        </p:tgtEl>
+                                        <p:attrNameLst>
+                                          <p:attrName>style.rotation</p:attrName>
+                                        </p:attrNameLst>
+                                      </p:cBhvr>
+                                      <p:tavLst>
+                                        <p:tav tm="0">
+                                          <p:val>
+                                            <p:fltVal val="90"/>
+                                          </p:val>
+                                        </p:tav>
+                                        <p:tav tm="100000">
+                                          <p:val>
+                                            <p:fltVal val="0"/>
+                                          </p:val>
+                                        </p:tav>
+                                      </p:tavLst>
+                                    </p:anim>
+                                    <p:animEffect transition="in" filter="fade">
+                                      <p:cBhvr>
+                                        <p:cTn id="34" dur="1000"/>
+                                        <p:tgtEl>
+                                          <p:spTgt spid="13"/>
+                                        </p:tgtEl>
+                                      </p:cBhvr>
+                                    </p:animEffect>
+                                  </p:childTnLst>
+                                </p:cTn>
+                              </p:par>
+                            </p:childTnLst>
+                          </p:cTn>
+                        </p:par>
+                      </p:childTnLst>
+                    </p:cTn>
+                  </p:par>
+                  <p:par>
+                    <p:cTn id="35" fill="hold">
+                      <p:stCondLst>
+                        <p:cond delay="indefinite"/>
+                      </p:stCondLst>
+                      <p:childTnLst>
+                        <p:par>
+                          <p:cTn id="36" fill="hold">
+                            <p:stCondLst>
+                              <p:cond delay="0"/>
+                            </p:stCondLst>
+                            <p:childTnLst>
+                              <p:par>
+                                <p:cTn id="37" presetID="31" presetClass="entr" presetSubtype="0" fill="hold" grpId="0" nodeType="clickEffect">
+                                  <p:stCondLst>
+                                    <p:cond delay="0"/>
+                                  </p:stCondLst>
+                                  <p:childTnLst>
+                                    <p:set>
+                                      <p:cBhvr>
+                                        <p:cTn id="38" dur="1" fill="hold">
+                                          <p:stCondLst>
+                                            <p:cond delay="0"/>
+                                          </p:stCondLst>
+                                        </p:cTn>
+                                        <p:tgtEl>
+                                          <p:spTgt spid="11"/>
+                                        </p:tgtEl>
+                                        <p:attrNameLst>
+                                          <p:attrName>style.visibility</p:attrName>
+                                        </p:attrNameLst>
+                                      </p:cBhvr>
+                                      <p:to>
+                                        <p:strVal val="visible"/>
+                                      </p:to>
+                                    </p:set>
+                                    <p:anim calcmode="lin" valueType="num">
+                                      <p:cBhvr>
+                                        <p:cTn id="39" dur="1000" fill="hold"/>
+                                        <p:tgtEl>
+                                          <p:spTgt spid="11"/>
+                                        </p:tgtEl>
+                                        <p:attrNameLst>
+                                          <p:attrName>ppt_w</p:attrName>
+                                        </p:attrNameLst>
+                                      </p:cBhvr>
+                                      <p:tavLst>
+                                        <p:tav tm="0">
+                                          <p:val>
+                                            <p:fltVal val="0"/>
+                                          </p:val>
+                                        </p:tav>
+                                        <p:tav tm="100000">
+                                          <p:val>
+                                            <p:strVal val="#ppt_w"/>
+                                          </p:val>
+                                        </p:tav>
+                                      </p:tavLst>
+                                    </p:anim>
+                                    <p:anim calcmode="lin" valueType="num">
+                                      <p:cBhvr>
+                                        <p:cTn id="40" dur="1000" fill="hold"/>
+                                        <p:tgtEl>
+                                          <p:spTgt spid="11"/>
+                                        </p:tgtEl>
+                                        <p:attrNameLst>
+                                          <p:attrName>ppt_h</p:attrName>
+                                        </p:attrNameLst>
+                                      </p:cBhvr>
+                                      <p:tavLst>
+                                        <p:tav tm="0">
+                                          <p:val>
+                                            <p:fltVal val="0"/>
+                                          </p:val>
+                                        </p:tav>
+                                        <p:tav tm="100000">
+                                          <p:val>
+                                            <p:strVal val="#ppt_h"/>
+                                          </p:val>
+                                        </p:tav>
+                                      </p:tavLst>
+                                    </p:anim>
+                                    <p:anim calcmode="lin" valueType="num">
+                                      <p:cBhvr>
+                                        <p:cTn id="41" dur="1000" fill="hold"/>
+                                        <p:tgtEl>
+                                          <p:spTgt spid="11"/>
+                                        </p:tgtEl>
+                                        <p:attrNameLst>
+                                          <p:attrName>style.rotation</p:attrName>
+                                        </p:attrNameLst>
+                                      </p:cBhvr>
+                                      <p:tavLst>
+                                        <p:tav tm="0">
+                                          <p:val>
+                                            <p:fltVal val="90"/>
+                                          </p:val>
+                                        </p:tav>
+                                        <p:tav tm="100000">
+                                          <p:val>
+                                            <p:fltVal val="0"/>
+                                          </p:val>
+                                        </p:tav>
+                                      </p:tavLst>
+                                    </p:anim>
+                                    <p:animEffect transition="in" filter="fade">
+                                      <p:cBhvr>
+                                        <p:cTn id="42" dur="1000"/>
+                                        <p:tgtEl>
+                                          <p:spTgt spid="11"/>
+                                        </p:tgtEl>
+                                      </p:cBhvr>
+                                    </p:animEffect>
+                                  </p:childTnLst>
+                                </p:cTn>
+                              </p:par>
+                            </p:childTnLst>
+                          </p:cTn>
+                        </p:par>
+                      </p:childTnLst>
+                    </p:cTn>
+                  </p:par>
+                  <p:par>
+                    <p:cTn id="43" fill="hold">
+                      <p:stCondLst>
+                        <p:cond delay="indefinite"/>
+                      </p:stCondLst>
+                      <p:childTnLst>
+                        <p:par>
+                          <p:cTn id="44" fill="hold">
+                            <p:stCondLst>
+                              <p:cond delay="0"/>
+                            </p:stCondLst>
+                            <p:childTnLst>
+                              <p:par>
+                                <p:cTn id="45" presetID="1" presetClass="entr" presetSubtype="0" fill="hold" nodeType="clickEffect">
+                                  <p:stCondLst>
+                                    <p:cond delay="0"/>
+                                  </p:stCondLst>
+                                  <p:childTnLst>
+                                    <p:set>
+                                      <p:cBhvr>
+                                        <p:cTn id="46" dur="1" fill="hold">
                                           <p:stCondLst>
                                             <p:cond delay="0"/>
                                           </p:stCondLst>
@@ -6722,14 +7627,14 @@
                                 </p:cTn>
                               </p:par>
                               <p:par>
-                                <p:cTn id="31" presetID="1" presetClass="exit" presetSubtype="0" fill="hold" nodeType="withEffect">
+                                <p:cTn id="47" presetID="1" presetClass="exit" presetSubtype="0" fill="hold" nodeType="withEffect">
                                   <p:stCondLst>
                                     <p:cond delay="0"/>
                                   </p:stCondLst>
                                   <p:childTnLst>
                                     <p:set>
                                       <p:cBhvr>
-                                        <p:cTn id="32" dur="1" fill="hold">
+                                        <p:cTn id="48" dur="1" fill="hold">
                                           <p:stCondLst>
                                             <p:cond delay="0"/>
                                           </p:stCondLst>
@@ -6755,26 +7660,26 @@
                     </p:cTn>
                   </p:par>
                   <p:par>
-                    <p:cTn id="33" fill="hold">
+                    <p:cTn id="49" fill="hold">
                       <p:stCondLst>
                         <p:cond delay="indefinite"/>
                       </p:stCondLst>
                       <p:childTnLst>
                         <p:par>
-                          <p:cTn id="34" fill="hold">
+                          <p:cTn id="50" fill="hold">
                             <p:stCondLst>
                               <p:cond delay="0"/>
                             </p:stCondLst>
                             <p:childTnLst>
                               <p:par>
-                                <p:cTn id="35" presetID="1" presetClass="entr" presetSubtype="0" fill="hold" nodeType="clickEffect">
+                                <p:cTn id="51" presetID="1" presetClass="entr" presetSubtype="0" fill="hold" nodeType="clickEffect">
                                   <p:stCondLst>
                                     <p:cond delay="0"/>
                                   </p:stCondLst>
                                   <p:childTnLst>
                                     <p:set>
                                       <p:cBhvr>
-                                        <p:cTn id="36" dur="1" fill="hold">
+                                        <p:cTn id="52" dur="1" fill="hold">
                                           <p:stCondLst>
                                             <p:cond delay="0"/>
                                           </p:stCondLst>
@@ -6794,14 +7699,14 @@
                                 </p:cTn>
                               </p:par>
                               <p:par>
-                                <p:cTn id="37" presetID="1" presetClass="exit" presetSubtype="0" fill="hold" nodeType="withEffect">
+                                <p:cTn id="53" presetID="1" presetClass="exit" presetSubtype="0" fill="hold" nodeType="withEffect">
                                   <p:stCondLst>
                                     <p:cond delay="0"/>
                                   </p:stCondLst>
                                   <p:childTnLst>
                                     <p:set>
                                       <p:cBhvr>
-                                        <p:cTn id="38" dur="1" fill="hold">
+                                        <p:cTn id="54" dur="1" fill="hold">
                                           <p:stCondLst>
                                             <p:cond delay="0"/>
                                           </p:stCondLst>
@@ -6849,6 +7754,8 @@
     </p:tnLst>
     <p:bldLst>
       <p:bldP spid="5" grpId="1" animBg="1"/>
+      <p:bldP spid="13" grpId="0" animBg="1"/>
+      <p:bldP spid="11" grpId="0" animBg="1"/>
     </p:bldLst>
   </p:timing>
 </p:sld>

</xml_diff>

<commit_message>
Added a few additional comments
Adding a couple of comments regarding nulls to remember when doing the presentation.
</commit_message>
<xml_diff>
--- a/FeaturesVsLayers.pptx
+++ b/FeaturesVsLayers.pptx
@@ -576,7 +576,15 @@
             </a:pPr>
             <a:r>
               <a:rPr lang="en-US" baseline="0" dirty="0" smtClean="0"/>
-              <a:t>I hate null. Originally mean memory location 0x00 on memory. Is a value without real meaning. There is no metadata associated.</a:t>
+              <a:t>I hate null. Originally mean memory location </a:t>
+            </a:r>
+            <a:r>
+              <a:rPr lang="en-US" baseline="0" dirty="0" smtClean="0"/>
+              <a:t>0x0 </a:t>
+            </a:r>
+            <a:r>
+              <a:rPr lang="en-US" baseline="0" dirty="0" smtClean="0"/>
+              <a:t>on memory. Is a value without real meaning. There is no metadata associated.</a:t>
             </a:r>
           </a:p>
           <a:p>
@@ -604,8 +612,45 @@
             </a:pPr>
             <a:r>
               <a:rPr lang="en-US" baseline="0" dirty="0" smtClean="0"/>
-              <a:t>Same, no real meaning, no metadata.</a:t>
+              <a:t>Same, no real meaning, no metadata</a:t>
             </a:r>
+            <a:r>
+              <a:rPr lang="en-US" baseline="0" dirty="0" smtClean="0"/>
+              <a:t>.</a:t>
+            </a:r>
+          </a:p>
+          <a:p>
+            <a:pPr marL="0" indent="0">
+              <a:buFontTx/>
+              <a:buNone/>
+            </a:pPr>
+            <a:r>
+              <a:rPr lang="en-US" baseline="0" dirty="0" smtClean="0"/>
+              <a:t>Tony Hoare, the creator of null, 1 billion mistake. He would prefer not to have </a:t>
+            </a:r>
+            <a:r>
+              <a:rPr lang="en-US" baseline="0" smtClean="0"/>
+              <a:t>invented it.</a:t>
+            </a:r>
+            <a:endParaRPr lang="en-US" baseline="0" dirty="0" smtClean="0"/>
+          </a:p>
+          <a:p>
+            <a:pPr marL="0" indent="0">
+              <a:buFontTx/>
+              <a:buNone/>
+            </a:pPr>
+            <a:endParaRPr lang="en-US" baseline="0" dirty="0" smtClean="0"/>
+          </a:p>
+          <a:p>
+            <a:pPr marL="0" indent="0">
+              <a:buFontTx/>
+              <a:buNone/>
+            </a:pPr>
+            <a:r>
+              <a:rPr lang="en-US" baseline="0" dirty="0" smtClean="0"/>
+              <a:t>Some languages having null, but not being location 0x0</a:t>
+            </a:r>
+            <a:endParaRPr lang="en-US" baseline="0" dirty="0" smtClean="0"/>
           </a:p>
           <a:p>
             <a:pPr marL="0" indent="0">
@@ -898,8 +943,8 @@
               <a:t>Show </a:t>
             </a:r>
             <a:r>
-              <a:rPr lang="en-US" dirty="0" err="1" smtClean="0"/>
-              <a:t>Promocode</a:t>
+              <a:rPr lang="en-US" dirty="0" smtClean="0"/>
+              <a:t>example</a:t>
             </a:r>
             <a:r>
               <a:rPr lang="en-US" baseline="0" dirty="0" smtClean="0"/>
@@ -2058,11 +2103,29 @@
           <a:p>
             <a:r>
               <a:rPr lang="en-US" baseline="0" dirty="0" smtClean="0"/>
-              <a:t>Lets see </a:t>
+              <a:t>Lets see an example!!</a:t>
+            </a:r>
+          </a:p>
+          <a:p>
+            <a:endParaRPr lang="en-US" baseline="0" dirty="0" smtClean="0"/>
+          </a:p>
+          <a:p>
+            <a:endParaRPr lang="en-US" baseline="0" dirty="0" smtClean="0"/>
+          </a:p>
+          <a:p>
+            <a:r>
+              <a:rPr lang="en-US" baseline="0" dirty="0" smtClean="0"/>
+              <a:t>But if we use layers, the objects that deal with a layer do they need to know what is below them?</a:t>
+            </a:r>
+          </a:p>
+          <a:p>
+            <a:r>
+              <a:rPr lang="en-US" baseline="0" dirty="0" err="1" smtClean="0"/>
+              <a:t>Owin</a:t>
             </a:r>
             <a:r>
-              <a:rPr lang="en-US" baseline="0" smtClean="0"/>
-              <a:t>an example!!</a:t>
+              <a:rPr lang="en-US" baseline="0" dirty="0" smtClean="0"/>
+              <a:t> middleware how to deal with it kind of nicely. Static language is on the way.</a:t>
             </a:r>
           </a:p>
           <a:p>

</xml_diff>

<commit_message>
Additional comments addedto the monolith slide
</commit_message>
<xml_diff>
--- a/FeaturesVsLayers.pptx
+++ b/FeaturesVsLayers.pptx
@@ -626,13 +626,8 @@
             </a:pPr>
             <a:r>
               <a:rPr lang="en-US" baseline="0" dirty="0" smtClean="0"/>
-              <a:t>Tony Hoare, the creator of null, 1 billion mistake. He would prefer not to have </a:t>
-            </a:r>
-            <a:r>
-              <a:rPr lang="en-US" baseline="0" smtClean="0"/>
-              <a:t>invented it.</a:t>
-            </a:r>
-            <a:endParaRPr lang="en-US" baseline="0" dirty="0" smtClean="0"/>
+              <a:t>Tony Hoare, the creator of null, 1 billion mistake. He would prefer not to have invented it.</a:t>
+            </a:r>
           </a:p>
           <a:p>
             <a:pPr marL="0" indent="0">
@@ -648,7 +643,7 @@
             </a:pPr>
             <a:r>
               <a:rPr lang="en-US" baseline="0" dirty="0" smtClean="0"/>
-              <a:t>Some languages having null, but not being location 0x0</a:t>
+              <a:t>Some languages having null, but not being location 0x0. Nil in Swift. Is a construct. But with the same properties.</a:t>
             </a:r>
             <a:endParaRPr lang="en-US" baseline="0" dirty="0" smtClean="0"/>
           </a:p>
@@ -1304,6 +1299,29 @@
             </a:pPr>
             <a:r>
               <a:rPr lang="en-GB" baseline="0" dirty="0" smtClean="0"/>
+              <a:t>I need an assistant, anyone? Not pretty enough/too pretty (will distract from me)</a:t>
+            </a:r>
+          </a:p>
+          <a:p>
+            <a:pPr marL="0" marR="0" indent="0" algn="l" defTabSz="457200" rtl="0" eaLnBrk="1" fontAlgn="auto" latinLnBrk="0" hangingPunct="1">
+              <a:lnSpc>
+                <a:spcPct val="100000"/>
+              </a:lnSpc>
+              <a:spcBef>
+                <a:spcPts val="0"/>
+              </a:spcBef>
+              <a:spcAft>
+                <a:spcPts val="0"/>
+              </a:spcAft>
+              <a:buClrTx/>
+              <a:buSzTx/>
+              <a:buFontTx/>
+              <a:buNone/>
+              <a:tabLst/>
+              <a:defRPr/>
+            </a:pPr>
+            <a:r>
+              <a:rPr lang="en-GB" baseline="0" dirty="0" smtClean="0"/>
               <a:t>So, now I’m going to introduce you to my assistant: Bill (click)</a:t>
             </a:r>
             <a:endParaRPr lang="en-US" dirty="0" smtClean="0"/>
@@ -1628,7 +1646,15 @@
           <a:p>
             <a:r>
               <a:rPr lang="en-GB" baseline="0" dirty="0" smtClean="0"/>
-              <a:t>And how to create/design/despair</a:t>
+              <a:t>And how </a:t>
+            </a:r>
+            <a:r>
+              <a:rPr lang="en-GB" baseline="0" dirty="0" smtClean="0"/>
+              <a:t>we </a:t>
+            </a:r>
+            <a:r>
+              <a:rPr lang="en-GB" baseline="0" dirty="0" smtClean="0"/>
+              <a:t>create/design/despair</a:t>
             </a:r>
           </a:p>
         </p:txBody>
@@ -1719,7 +1745,15 @@
             </a:r>
             <a:r>
               <a:rPr lang="en-GB" baseline="0" dirty="0" smtClean="0"/>
-              <a:t> we need is always to make something work. How it works is not as important. &lt;click&gt;</a:t>
+              <a:t> we need is always to make something work. How it works is not as important. </a:t>
+            </a:r>
+            <a:r>
+              <a:rPr lang="en-GB" baseline="0" dirty="0" smtClean="0"/>
+              <a:t>Make it run, make it right, make it fast (Douglas Kent Beck, who just passed away)&lt;</a:t>
+            </a:r>
+            <a:r>
+              <a:rPr lang="en-GB" baseline="0" dirty="0" smtClean="0"/>
+              <a:t>click&gt;</a:t>
             </a:r>
           </a:p>
           <a:p>
@@ -1755,8 +1789,34 @@
           <a:p>
             <a:r>
               <a:rPr lang="en-GB" baseline="0" dirty="0" smtClean="0"/>
-              <a:t>But of course. This is problematic. You know, a monolith is more difficult to change, more difficult to maintain.&lt;click&gt;</a:t>
-            </a:r>
+              <a:t>But of course. This is problematic. You know, a monolith is more difficult to change, more difficult to </a:t>
+            </a:r>
+            <a:r>
+              <a:rPr lang="en-GB" baseline="0" dirty="0" err="1" smtClean="0"/>
+              <a:t>imrpove</a:t>
+            </a:r>
+            <a:r>
+              <a:rPr lang="en-GB" baseline="0" dirty="0" smtClean="0"/>
+              <a:t>, more difficult to scale?&lt;</a:t>
+            </a:r>
+            <a:r>
+              <a:rPr lang="en-GB" baseline="0" dirty="0" smtClean="0"/>
+              <a:t>click</a:t>
+            </a:r>
+            <a:r>
+              <a:rPr lang="en-GB" baseline="0" dirty="0" smtClean="0"/>
+              <a:t>&gt;</a:t>
+            </a:r>
+          </a:p>
+          <a:p>
+            <a:endParaRPr lang="en-GB" baseline="0" dirty="0" smtClean="0"/>
+          </a:p>
+          <a:p>
+            <a:r>
+              <a:rPr lang="en-GB" baseline="0" dirty="0" smtClean="0"/>
+              <a:t>DHH – Majestic monolith (yesterday) – Good for small teams/small codebases. We already doing distributed computing.</a:t>
+            </a:r>
+            <a:endParaRPr lang="en-GB" baseline="0" dirty="0" smtClean="0"/>
           </a:p>
           <a:p>
             <a:endParaRPr lang="en-GB" baseline="0" dirty="0" smtClean="0"/>
@@ -11937,8 +11997,8 @@
         </p:nvSpPr>
         <p:spPr>
           <a:xfrm>
-            <a:off x="1094131" y="2044005"/>
-            <a:ext cx="6955750" cy="923330"/>
+            <a:off x="2704473" y="2044005"/>
+            <a:ext cx="3735067" cy="923330"/>
           </a:xfrm>
           <a:prstGeom prst="rect">
             <a:avLst/>
@@ -11972,7 +12032,51 @@
                   </a:outerShdw>
                 </a:effectLst>
               </a:rPr>
-              <a:t>Ha, Ha, explanations</a:t>
+              <a:t>Ha, Ha</a:t>
+            </a:r>
+            <a:r>
+              <a:rPr lang="en-US" sz="5400" b="1" cap="none" spc="0" smtClean="0">
+                <a:ln w="9525">
+                  <a:solidFill>
+                    <a:schemeClr val="bg1"/>
+                  </a:solidFill>
+                  <a:prstDash val="solid"/>
+                </a:ln>
+                <a:solidFill>
+                  <a:schemeClr val="accent5"/>
+                </a:solidFill>
+                <a:effectLst>
+                  <a:outerShdw blurRad="12700" dist="38100" dir="2700000" algn="tl" rotWithShape="0">
+                    <a:schemeClr val="accent5">
+                      <a:lumMod val="60000"/>
+                      <a:lumOff val="40000"/>
+                    </a:schemeClr>
+                  </a:outerShdw>
+                </a:effectLst>
+              </a:rPr>
+              <a:t>, </a:t>
+            </a:r>
+            <a:r>
+              <a:rPr lang="en-US" sz="5400" b="1" cap="none" spc="0" smtClean="0">
+                <a:ln w="9525">
+                  <a:solidFill>
+                    <a:schemeClr val="bg1"/>
+                  </a:solidFill>
+                  <a:prstDash val="solid"/>
+                </a:ln>
+                <a:solidFill>
+                  <a:schemeClr val="accent5"/>
+                </a:solidFill>
+                <a:effectLst>
+                  <a:outerShdw blurRad="12700" dist="38100" dir="2700000" algn="tl" rotWithShape="0">
+                    <a:schemeClr val="accent5">
+                      <a:lumMod val="60000"/>
+                      <a:lumOff val="40000"/>
+                    </a:schemeClr>
+                  </a:outerShdw>
+                </a:effectLst>
+              </a:rPr>
+              <a:t>42</a:t>
             </a:r>
             <a:endParaRPr lang="en-US" sz="5400" b="1" cap="none" spc="0" dirty="0">
               <a:ln w="9525">
@@ -14197,8 +14301,8 @@
         </p:nvSpPr>
         <p:spPr>
           <a:xfrm rot="21084633">
-            <a:off x="5296808" y="1379218"/>
-            <a:ext cx="3294743" cy="2496457"/>
+            <a:off x="5132071" y="1379218"/>
+            <a:ext cx="3624217" cy="2496457"/>
           </a:xfrm>
           <a:prstGeom prst="irregularSeal2">
             <a:avLst/>
@@ -14225,7 +14329,7 @@
             <a:pPr algn="ctr"/>
             <a:r>
               <a:rPr lang="en-GB" dirty="0" smtClean="0"/>
-              <a:t>Maintain</a:t>
+              <a:t>Change</a:t>
             </a:r>
             <a:endParaRPr lang="en-US" dirty="0"/>
           </a:p>
@@ -14267,7 +14371,7 @@
             <a:pPr algn="ctr"/>
             <a:r>
               <a:rPr lang="en-GB" dirty="0" smtClean="0"/>
-              <a:t>Change</a:t>
+              <a:t>Improve</a:t>
             </a:r>
             <a:endParaRPr lang="en-US" dirty="0"/>
           </a:p>
@@ -14309,7 +14413,7 @@
             <a:pPr algn="ctr"/>
             <a:r>
               <a:rPr lang="en-GB" dirty="0" smtClean="0"/>
-              <a:t>Improve</a:t>
+              <a:t>Scale?</a:t>
             </a:r>
             <a:endParaRPr lang="en-US" dirty="0"/>
           </a:p>

</xml_diff>

<commit_message>
Modifications for the LSCC presentation
A few modifications have been done. The intro is completely different. Dark Helment and Phil Ken Sebben have been taken out of the presentation. A slide with two issues of features (duplication and granularity) have been added
</commit_message>
<xml_diff>
--- a/FeaturesVsLayers.pptx
+++ b/FeaturesVsLayers.pptx
@@ -5,23 +5,26 @@
     <p:sldMasterId id="2147483660" r:id="rId1"/>
   </p:sldMasterIdLst>
   <p:notesMasterIdLst>
-    <p:notesMasterId r:id="rId16"/>
+    <p:notesMasterId r:id="rId19"/>
   </p:notesMasterIdLst>
   <p:sldIdLst>
     <p:sldId id="256" r:id="rId2"/>
-    <p:sldId id="269" r:id="rId3"/>
-    <p:sldId id="261" r:id="rId4"/>
-    <p:sldId id="262" r:id="rId5"/>
-    <p:sldId id="264" r:id="rId6"/>
-    <p:sldId id="263" r:id="rId7"/>
-    <p:sldId id="265" r:id="rId8"/>
-    <p:sldId id="266" r:id="rId9"/>
-    <p:sldId id="257" r:id="rId10"/>
+    <p:sldId id="261" r:id="rId3"/>
+    <p:sldId id="262" r:id="rId4"/>
+    <p:sldId id="264" r:id="rId5"/>
+    <p:sldId id="263" r:id="rId6"/>
+    <p:sldId id="265" r:id="rId7"/>
+    <p:sldId id="266" r:id="rId8"/>
+    <p:sldId id="257" r:id="rId9"/>
+    <p:sldId id="270" r:id="rId10"/>
     <p:sldId id="258" r:id="rId11"/>
     <p:sldId id="259" r:id="rId12"/>
-    <p:sldId id="268" r:id="rId13"/>
-    <p:sldId id="260" r:id="rId14"/>
-    <p:sldId id="267" r:id="rId15"/>
+    <p:sldId id="272" r:id="rId13"/>
+    <p:sldId id="268" r:id="rId14"/>
+    <p:sldId id="260" r:id="rId15"/>
+    <p:sldId id="267" r:id="rId16"/>
+    <p:sldId id="271" r:id="rId17"/>
+    <p:sldId id="269" r:id="rId18"/>
   </p:sldIdLst>
   <p:sldSz cx="9144000" cy="6858000" type="screen4x3"/>
   <p:notesSz cx="6858000" cy="9144000"/>
@@ -122,7 +125,7 @@
   </p:defaultTextStyle>
   <p:extLst>
     <p:ext uri="{EFAFB233-063F-42B5-8137-9DF3F51BA10A}">
-      <p15:sldGuideLst xmlns:p15="http://schemas.microsoft.com/office/powerpoint/2012/main" xmlns="">
+      <p15:sldGuideLst xmlns="" xmlns:p15="http://schemas.microsoft.com/office/powerpoint/2012/main">
         <p15:guide id="1" orient="horz" pos="2160">
           <p15:clr>
             <a:srgbClr val="A4A3A4"/>
@@ -221,7 +224,7 @@
           <a:p>
             <a:fld id="{42140A06-DE53-954F-B7AB-07F13EFF4F14}" type="datetimeFigureOut">
               <a:rPr lang="en-US" smtClean="0"/>
-              <a:t>27/02/16</a:t>
+              <a:t>14/03/16</a:t>
             </a:fld>
             <a:endParaRPr lang="en-US"/>
           </a:p>
@@ -549,137 +552,23 @@
           <a:p>
             <a:r>
               <a:rPr lang="en-US" dirty="0" smtClean="0"/>
-              <a:t>Intro:</a:t>
+              <a:t>Intro</a:t>
             </a:r>
-          </a:p>
-          <a:p>
-            <a:pPr marL="171450" indent="-171450">
-              <a:buFontTx/>
-              <a:buChar char="-"/>
-            </a:pPr>
             <a:r>
-              <a:rPr lang="en-US" baseline="0" dirty="0" smtClean="0"/>
-              <a:t>Is not related to the main point.</a:t>
+              <a:rPr lang="en-US" dirty="0" smtClean="0"/>
+              <a:t>:</a:t>
             </a:r>
           </a:p>
           <a:p>
-            <a:pPr marL="171450" indent="-171450">
-              <a:buFontTx/>
-              <a:buChar char="-"/>
-            </a:pPr>
-            <a:endParaRPr lang="en-US" baseline="0" dirty="0" smtClean="0"/>
-          </a:p>
-          <a:p>
-            <a:pPr marL="0" indent="0">
-              <a:buFontTx/>
-              <a:buNone/>
-            </a:pPr>
             <a:r>
-              <a:rPr lang="en-US" baseline="0" dirty="0" smtClean="0"/>
-              <a:t>I hate null. Originally mean memory location </a:t>
+              <a:rPr lang="en-US" dirty="0" smtClean="0"/>
+              <a:t>I like talking</a:t>
             </a:r>
             <a:r>
               <a:rPr lang="en-US" baseline="0" dirty="0" smtClean="0"/>
-              <a:t>0x0 </a:t>
+              <a:t> and teaching. Not because I consider myself the knees bees. But because it helps me to understand better the topic. And because then I hear myself talking and go “did I say that stupidity?”. It helps me learn. Impostor syndrome? I look at the rubber-duck style of resolving issues. You are all my rubber-ducks</a:t>
             </a:r>
-            <a:r>
-              <a:rPr lang="en-US" baseline="0" dirty="0" smtClean="0"/>
-              <a:t>on memory. Is a value without real meaning. There is no metadata associated.</a:t>
-            </a:r>
-          </a:p>
-          <a:p>
-            <a:pPr marL="0" indent="0">
-              <a:buFontTx/>
-              <a:buNone/>
-            </a:pPr>
-            <a:r>
-              <a:rPr lang="en-US" baseline="0" dirty="0" smtClean="0"/>
-              <a:t>When you can’t use null because is not a reference? </a:t>
-            </a:r>
-            <a:r>
-              <a:rPr lang="en-US" baseline="0" dirty="0" err="1" smtClean="0"/>
-              <a:t>String.IndexOf</a:t>
-            </a:r>
-            <a:r>
-              <a:rPr lang="en-US" baseline="0" dirty="0" smtClean="0"/>
-              <a:t>() -1</a:t>
-            </a:r>
-          </a:p>
-          <a:p>
-            <a:pPr marL="0" indent="0">
-              <a:buFontTx/>
-              <a:buNone/>
-            </a:pPr>
-            <a:r>
-              <a:rPr lang="en-US" baseline="0" dirty="0" smtClean="0"/>
-              <a:t>Same, no real meaning, no metadata</a:t>
-            </a:r>
-            <a:r>
-              <a:rPr lang="en-US" baseline="0" dirty="0" smtClean="0"/>
-              <a:t>.</a:t>
-            </a:r>
-          </a:p>
-          <a:p>
-            <a:pPr marL="0" indent="0">
-              <a:buFontTx/>
-              <a:buNone/>
-            </a:pPr>
-            <a:r>
-              <a:rPr lang="en-US" baseline="0" dirty="0" smtClean="0"/>
-              <a:t>Tony Hoare, the creator of null, 1 billion mistake. He would prefer not to have invented it.</a:t>
-            </a:r>
-          </a:p>
-          <a:p>
-            <a:pPr marL="0" indent="0">
-              <a:buFontTx/>
-              <a:buNone/>
-            </a:pPr>
-            <a:endParaRPr lang="en-US" baseline="0" dirty="0" smtClean="0"/>
-          </a:p>
-          <a:p>
-            <a:pPr marL="0" indent="0">
-              <a:buFontTx/>
-              <a:buNone/>
-            </a:pPr>
-            <a:r>
-              <a:rPr lang="en-US" baseline="0" dirty="0" smtClean="0"/>
-              <a:t>Some languages having null, but not being location 0x0. Nil in Swift. Is a construct. But with the same properties.</a:t>
-            </a:r>
-            <a:endParaRPr lang="en-US" baseline="0" dirty="0" smtClean="0"/>
-          </a:p>
-          <a:p>
-            <a:pPr marL="0" indent="0">
-              <a:buFontTx/>
-              <a:buNone/>
-            </a:pPr>
-            <a:endParaRPr lang="en-US" baseline="0" dirty="0" smtClean="0"/>
-          </a:p>
-          <a:p>
-            <a:pPr marL="0" indent="0">
-              <a:buFontTx/>
-              <a:buNone/>
-            </a:pPr>
-            <a:r>
-              <a:rPr lang="en-US" baseline="0" dirty="0" smtClean="0"/>
-              <a:t>And then I learned about Algebraic Data Types and the Maybe Monad on functional languages. Oh the breeze, so much easier to deal with mistakes and errors.</a:t>
-            </a:r>
-          </a:p>
-          <a:p>
-            <a:pPr marL="0" indent="0">
-              <a:buFontTx/>
-              <a:buNone/>
-            </a:pPr>
-            <a:endParaRPr lang="en-GB" baseline="0" dirty="0" smtClean="0"/>
-          </a:p>
-          <a:p>
-            <a:pPr marL="0" indent="0">
-              <a:buFontTx/>
-              <a:buNone/>
-            </a:pPr>
-            <a:r>
-              <a:rPr lang="en-GB" baseline="0" dirty="0" smtClean="0"/>
-              <a:t>What this have to do with what I’m talking about?</a:t>
-            </a:r>
+            <a:endParaRPr lang="en-US" dirty="0" smtClean="0"/>
           </a:p>
         </p:txBody>
       </p:sp>
@@ -935,11 +824,7 @@
           <a:p>
             <a:r>
               <a:rPr lang="en-US" dirty="0" smtClean="0"/>
-              <a:t>Show </a:t>
-            </a:r>
-            <a:r>
-              <a:rPr lang="en-US" dirty="0" smtClean="0"/>
-              <a:t>example</a:t>
+              <a:t>Show example</a:t>
             </a:r>
             <a:r>
               <a:rPr lang="en-US" baseline="0" dirty="0" smtClean="0"/>
@@ -1030,12 +915,43 @@
           <a:lstStyle/>
           <a:p>
             <a:r>
-              <a:rPr lang="en-GB" dirty="0" smtClean="0"/>
-              <a:t>Did I just advocated</a:t>
+              <a:rPr lang="en-US" dirty="0" smtClean="0"/>
+              <a:t>But Bill</a:t>
+            </a:r>
+          </a:p>
+          <a:p>
+            <a:endParaRPr lang="en-US" dirty="0" smtClean="0"/>
+          </a:p>
+          <a:p>
+            <a:r>
+              <a:rPr lang="en-US" dirty="0" smtClean="0"/>
+              <a:t>What</a:t>
             </a:r>
             <a:r>
-              <a:rPr lang="en-GB" baseline="0" dirty="0" smtClean="0"/>
-              <a:t> for micro-services with my cakes?</a:t>
+              <a:rPr lang="en-US" baseline="0" dirty="0" smtClean="0"/>
+              <a:t> about Duplication</a:t>
+            </a:r>
+          </a:p>
+          <a:p>
+            <a:endParaRPr lang="en-US" baseline="0" dirty="0" smtClean="0"/>
+          </a:p>
+          <a:p>
+            <a:r>
+              <a:rPr lang="en-US" baseline="0" dirty="0" err="1" smtClean="0"/>
+              <a:t>DeDuplication</a:t>
+            </a:r>
+            <a:r>
+              <a:rPr lang="en-US" baseline="0" dirty="0" smtClean="0"/>
+              <a:t> only has to happen when the code is the same (or you can make it look the same) and the reason for changing is the same. Otherwise you will end introducing complexity</a:t>
+            </a:r>
+          </a:p>
+          <a:p>
+            <a:endParaRPr lang="en-US" baseline="0" dirty="0" smtClean="0"/>
+          </a:p>
+          <a:p>
+            <a:r>
+              <a:rPr lang="en-US" baseline="0" dirty="0" smtClean="0"/>
+              <a:t>Granularity. You have to decide, it depends on the language and the project. Do you want to group features because they will always go together?</a:t>
             </a:r>
             <a:endParaRPr lang="en-US" dirty="0"/>
           </a:p>
@@ -1067,7 +983,7 @@
     </p:spTree>
     <p:extLst>
       <p:ext uri="{BB962C8B-B14F-4D97-AF65-F5344CB8AC3E}">
-        <p14:creationId xmlns:p14="http://schemas.microsoft.com/office/powerpoint/2010/main" val="4163809378"/>
+        <p14:creationId xmlns:p14="http://schemas.microsoft.com/office/powerpoint/2010/main" val="648743644"/>
       </p:ext>
     </p:extLst>
   </p:cSld>
@@ -1122,16 +1038,12 @@
           <a:lstStyle/>
           <a:p>
             <a:r>
-              <a:rPr lang="en-US" dirty="0" smtClean="0"/>
-              <a:t>Add twitter </a:t>
+              <a:rPr lang="en-GB" dirty="0" smtClean="0"/>
+              <a:t>Did I just advocated</a:t>
             </a:r>
             <a:r>
-              <a:rPr lang="en-US" dirty="0" err="1" smtClean="0"/>
-              <a:t>github</a:t>
-            </a:r>
-            <a:r>
-              <a:rPr lang="en-US" baseline="0" dirty="0" smtClean="0"/>
-              <a:t> and blog</a:t>
+              <a:rPr lang="en-GB" baseline="0" dirty="0" smtClean="0"/>
+              <a:t> for micro-services with my cakes?</a:t>
             </a:r>
             <a:endParaRPr lang="en-US" dirty="0"/>
           </a:p>
@@ -1163,7 +1075,482 @@
     </p:spTree>
     <p:extLst>
       <p:ext uri="{BB962C8B-B14F-4D97-AF65-F5344CB8AC3E}">
+        <p14:creationId xmlns:p14="http://schemas.microsoft.com/office/powerpoint/2010/main" val="4163809378"/>
+      </p:ext>
+    </p:extLst>
+  </p:cSld>
+  <p:clrMapOvr>
+    <a:masterClrMapping/>
+  </p:clrMapOvr>
+</p:notes>
+</file>
+
+<file path=ppt/notesSlides/notesSlide14.xml><?xml version="1.0" encoding="utf-8"?>
+<p:notes xmlns:a="http://schemas.openxmlformats.org/drawingml/2006/main" xmlns:r="http://schemas.openxmlformats.org/officeDocument/2006/relationships" xmlns:p="http://schemas.openxmlformats.org/presentationml/2006/main">
+  <p:cSld>
+    <p:spTree>
+      <p:nvGrpSpPr>
+        <p:cNvPr id="1" name=""/>
+        <p:cNvGrpSpPr/>
+        <p:nvPr/>
+      </p:nvGrpSpPr>
+      <p:grpSpPr>
+        <a:xfrm>
+          <a:off x="0" y="0"/>
+          <a:ext cx="0" cy="0"/>
+          <a:chOff x="0" y="0"/>
+          <a:chExt cx="0" cy="0"/>
+        </a:xfrm>
+      </p:grpSpPr>
+      <p:sp>
+        <p:nvSpPr>
+          <p:cNvPr id="2" name="Slide Image Placeholder 1"/>
+          <p:cNvSpPr>
+            <a:spLocks noGrp="1" noRot="1" noChangeAspect="1"/>
+          </p:cNvSpPr>
+          <p:nvPr>
+            <p:ph type="sldImg"/>
+          </p:nvPr>
+        </p:nvSpPr>
+        <p:spPr/>
+      </p:sp>
+      <p:sp>
+        <p:nvSpPr>
+          <p:cNvPr id="3" name="Notes Placeholder 2"/>
+          <p:cNvSpPr>
+            <a:spLocks noGrp="1"/>
+          </p:cNvSpPr>
+          <p:nvPr>
+            <p:ph type="body" idx="1"/>
+          </p:nvPr>
+        </p:nvSpPr>
+        <p:spPr/>
+        <p:txBody>
+          <a:bodyPr/>
+          <a:lstStyle/>
+          <a:p>
+            <a:r>
+              <a:rPr lang="en-US" dirty="0" smtClean="0"/>
+              <a:t>Add twitter </a:t>
+            </a:r>
+            <a:r>
+              <a:rPr lang="en-US" dirty="0" err="1" smtClean="0"/>
+              <a:t>github</a:t>
+            </a:r>
+            <a:r>
+              <a:rPr lang="en-US" baseline="0" dirty="0" smtClean="0"/>
+              <a:t> and blog</a:t>
+            </a:r>
+            <a:endParaRPr lang="en-US" dirty="0"/>
+          </a:p>
+        </p:txBody>
+      </p:sp>
+      <p:sp>
+        <p:nvSpPr>
+          <p:cNvPr id="4" name="Slide Number Placeholder 3"/>
+          <p:cNvSpPr>
+            <a:spLocks noGrp="1"/>
+          </p:cNvSpPr>
+          <p:nvPr>
+            <p:ph type="sldNum" sz="quarter" idx="10"/>
+          </p:nvPr>
+        </p:nvSpPr>
+        <p:spPr/>
+        <p:txBody>
+          <a:bodyPr/>
+          <a:lstStyle/>
+          <a:p>
+            <a:fld id="{2345002C-B4C8-0744-B509-29A3CA95BDFE}" type="slidenum">
+              <a:rPr lang="en-US" smtClean="0"/>
+              <a:t>14</a:t>
+            </a:fld>
+            <a:endParaRPr lang="en-US"/>
+          </a:p>
+        </p:txBody>
+      </p:sp>
+    </p:spTree>
+    <p:extLst>
+      <p:ext uri="{BB962C8B-B14F-4D97-AF65-F5344CB8AC3E}">
         <p14:creationId xmlns:p14="http://schemas.microsoft.com/office/powerpoint/2010/main" val="435414379"/>
+      </p:ext>
+    </p:extLst>
+  </p:cSld>
+  <p:clrMapOvr>
+    <a:masterClrMapping/>
+  </p:clrMapOvr>
+</p:notes>
+</file>
+
+<file path=ppt/notesSlides/notesSlide15.xml><?xml version="1.0" encoding="utf-8"?>
+<p:notes xmlns:a="http://schemas.openxmlformats.org/drawingml/2006/main" xmlns:r="http://schemas.openxmlformats.org/officeDocument/2006/relationships" xmlns:p="http://schemas.openxmlformats.org/presentationml/2006/main">
+  <p:cSld>
+    <p:spTree>
+      <p:nvGrpSpPr>
+        <p:cNvPr id="1" name=""/>
+        <p:cNvGrpSpPr/>
+        <p:nvPr/>
+      </p:nvGrpSpPr>
+      <p:grpSpPr>
+        <a:xfrm>
+          <a:off x="0" y="0"/>
+          <a:ext cx="0" cy="0"/>
+          <a:chOff x="0" y="0"/>
+          <a:chExt cx="0" cy="0"/>
+        </a:xfrm>
+      </p:grpSpPr>
+      <p:sp>
+        <p:nvSpPr>
+          <p:cNvPr id="2" name="Slide Image Placeholder 1"/>
+          <p:cNvSpPr>
+            <a:spLocks noGrp="1" noRot="1" noChangeAspect="1"/>
+          </p:cNvSpPr>
+          <p:nvPr>
+            <p:ph type="sldImg"/>
+          </p:nvPr>
+        </p:nvSpPr>
+        <p:spPr/>
+      </p:sp>
+      <p:sp>
+        <p:nvSpPr>
+          <p:cNvPr id="3" name="Notes Placeholder 2"/>
+          <p:cNvSpPr>
+            <a:spLocks noGrp="1"/>
+          </p:cNvSpPr>
+          <p:nvPr>
+            <p:ph type="body" idx="1"/>
+          </p:nvPr>
+        </p:nvSpPr>
+        <p:spPr/>
+        <p:txBody>
+          <a:bodyPr/>
+          <a:lstStyle/>
+          <a:p>
+            <a:pPr marL="0" marR="0" indent="0" algn="l" defTabSz="457200" rtl="0" eaLnBrk="1" fontAlgn="auto" latinLnBrk="0" hangingPunct="1">
+              <a:lnSpc>
+                <a:spcPct val="100000"/>
+              </a:lnSpc>
+              <a:spcBef>
+                <a:spcPts val="0"/>
+              </a:spcBef>
+              <a:spcAft>
+                <a:spcPts val="0"/>
+              </a:spcAft>
+              <a:buClrTx/>
+              <a:buSzTx/>
+              <a:buFontTx/>
+              <a:buNone/>
+              <a:tabLst/>
+              <a:defRPr/>
+            </a:pPr>
+            <a:r>
+              <a:rPr lang="en-GB" baseline="0" dirty="0" smtClean="0"/>
+              <a:t>(Was second slide)</a:t>
+            </a:r>
+          </a:p>
+          <a:p>
+            <a:pPr marL="0" marR="0" indent="0" algn="l" defTabSz="457200" rtl="0" eaLnBrk="1" fontAlgn="auto" latinLnBrk="0" hangingPunct="1">
+              <a:lnSpc>
+                <a:spcPct val="100000"/>
+              </a:lnSpc>
+              <a:spcBef>
+                <a:spcPts val="0"/>
+              </a:spcBef>
+              <a:spcAft>
+                <a:spcPts val="0"/>
+              </a:spcAft>
+              <a:buClrTx/>
+              <a:buSzTx/>
+              <a:buFontTx/>
+              <a:buNone/>
+              <a:tabLst/>
+              <a:defRPr/>
+            </a:pPr>
+            <a:r>
+              <a:rPr lang="en-GB" baseline="0" dirty="0" smtClean="0"/>
+              <a:t>(Before this slide)</a:t>
+            </a:r>
+          </a:p>
+          <a:p>
+            <a:pPr marL="171450" indent="-171450">
+              <a:buFontTx/>
+              <a:buChar char="-"/>
+            </a:pPr>
+            <a:r>
+              <a:rPr lang="en-US" baseline="0" dirty="0" smtClean="0"/>
+              <a:t>Is not related to the main point.</a:t>
+            </a:r>
+          </a:p>
+          <a:p>
+            <a:pPr marL="171450" indent="-171450">
+              <a:buFontTx/>
+              <a:buChar char="-"/>
+            </a:pPr>
+            <a:endParaRPr lang="en-US" baseline="0" dirty="0" smtClean="0"/>
+          </a:p>
+          <a:p>
+            <a:pPr marL="0" indent="0">
+              <a:buFontTx/>
+              <a:buNone/>
+            </a:pPr>
+            <a:r>
+              <a:rPr lang="en-US" baseline="0" dirty="0" smtClean="0"/>
+              <a:t>I hate null. Originally mean memory location 0x0 on memory. Is a value without real meaning. There is no metadata associated.</a:t>
+            </a:r>
+          </a:p>
+          <a:p>
+            <a:pPr marL="0" indent="0">
+              <a:buFontTx/>
+              <a:buNone/>
+            </a:pPr>
+            <a:r>
+              <a:rPr lang="en-US" baseline="0" dirty="0" smtClean="0"/>
+              <a:t>When you can’t use null because is not a reference? </a:t>
+            </a:r>
+            <a:r>
+              <a:rPr lang="en-US" baseline="0" dirty="0" err="1" smtClean="0"/>
+              <a:t>String.IndexOf</a:t>
+            </a:r>
+            <a:r>
+              <a:rPr lang="en-US" baseline="0" dirty="0" smtClean="0"/>
+              <a:t>() -1</a:t>
+            </a:r>
+          </a:p>
+          <a:p>
+            <a:pPr marL="0" indent="0">
+              <a:buFontTx/>
+              <a:buNone/>
+            </a:pPr>
+            <a:r>
+              <a:rPr lang="en-US" baseline="0" dirty="0" smtClean="0"/>
+              <a:t>Same, no real meaning, no metadata.</a:t>
+            </a:r>
+          </a:p>
+          <a:p>
+            <a:pPr marL="0" indent="0">
+              <a:buFontTx/>
+              <a:buNone/>
+            </a:pPr>
+            <a:r>
+              <a:rPr lang="en-US" baseline="0" dirty="0" smtClean="0"/>
+              <a:t>Tony Hoare, the creator of null, 1 billion mistake. He would prefer not to have invented it.</a:t>
+            </a:r>
+          </a:p>
+          <a:p>
+            <a:pPr marL="0" indent="0">
+              <a:buFontTx/>
+              <a:buNone/>
+            </a:pPr>
+            <a:endParaRPr lang="en-US" baseline="0" dirty="0" smtClean="0"/>
+          </a:p>
+          <a:p>
+            <a:pPr marL="0" indent="0">
+              <a:buFontTx/>
+              <a:buNone/>
+            </a:pPr>
+            <a:r>
+              <a:rPr lang="en-US" baseline="0" dirty="0" smtClean="0"/>
+              <a:t>Some languages having null, but not being location 0x0. Nil in Swift. Is a construct. But with the same properties.</a:t>
+            </a:r>
+          </a:p>
+          <a:p>
+            <a:pPr marL="0" indent="0">
+              <a:buFontTx/>
+              <a:buNone/>
+            </a:pPr>
+            <a:endParaRPr lang="en-US" baseline="0" dirty="0" smtClean="0"/>
+          </a:p>
+          <a:p>
+            <a:pPr marL="0" indent="0">
+              <a:buFontTx/>
+              <a:buNone/>
+            </a:pPr>
+            <a:r>
+              <a:rPr lang="en-US" baseline="0" dirty="0" smtClean="0"/>
+              <a:t>And then I learned about Algebraic Data Types and the Maybe Monad on functional languages. Oh the breeze, so much easier to deal with mistakes and errors.</a:t>
+            </a:r>
+          </a:p>
+          <a:p>
+            <a:pPr marL="0" indent="0">
+              <a:buFontTx/>
+              <a:buNone/>
+            </a:pPr>
+            <a:endParaRPr lang="en-GB" baseline="0" dirty="0" smtClean="0"/>
+          </a:p>
+          <a:p>
+            <a:pPr marL="0" indent="0">
+              <a:buFontTx/>
+              <a:buNone/>
+            </a:pPr>
+            <a:r>
+              <a:rPr lang="en-GB" baseline="0" dirty="0" smtClean="0"/>
+              <a:t>What this have to do with what I’m talking about?</a:t>
+            </a:r>
+          </a:p>
+          <a:p>
+            <a:pPr marL="0" marR="0" indent="0" algn="l" defTabSz="457200" rtl="0" eaLnBrk="1" fontAlgn="auto" latinLnBrk="0" hangingPunct="1">
+              <a:lnSpc>
+                <a:spcPct val="100000"/>
+              </a:lnSpc>
+              <a:spcBef>
+                <a:spcPts val="0"/>
+              </a:spcBef>
+              <a:spcAft>
+                <a:spcPts val="0"/>
+              </a:spcAft>
+              <a:buClrTx/>
+              <a:buSzTx/>
+              <a:buFontTx/>
+              <a:buNone/>
+              <a:tabLst/>
+              <a:defRPr/>
+            </a:pPr>
+            <a:r>
+              <a:rPr lang="en-GB" baseline="0" dirty="0" smtClean="0"/>
+              <a:t>(Click into this slide)</a:t>
+            </a:r>
+          </a:p>
+          <a:p>
+            <a:pPr marL="0" marR="0" indent="0" algn="l" defTabSz="457200" rtl="0" eaLnBrk="1" fontAlgn="auto" latinLnBrk="0" hangingPunct="1">
+              <a:lnSpc>
+                <a:spcPct val="100000"/>
+              </a:lnSpc>
+              <a:spcBef>
+                <a:spcPts val="0"/>
+              </a:spcBef>
+              <a:spcAft>
+                <a:spcPts val="0"/>
+              </a:spcAft>
+              <a:buClrTx/>
+              <a:buSzTx/>
+              <a:buFontTx/>
+              <a:buNone/>
+              <a:tabLst/>
+              <a:defRPr/>
+            </a:pPr>
+            <a:endParaRPr lang="en-GB" baseline="0" dirty="0" smtClean="0"/>
+          </a:p>
+          <a:p>
+            <a:pPr marL="0" marR="0" indent="0" algn="l" defTabSz="457200" rtl="0" eaLnBrk="1" fontAlgn="auto" latinLnBrk="0" hangingPunct="1">
+              <a:lnSpc>
+                <a:spcPct val="100000"/>
+              </a:lnSpc>
+              <a:spcBef>
+                <a:spcPts val="0"/>
+              </a:spcBef>
+              <a:spcAft>
+                <a:spcPts val="0"/>
+              </a:spcAft>
+              <a:buClrTx/>
+              <a:buSzTx/>
+              <a:buFontTx/>
+              <a:buNone/>
+              <a:tabLst/>
+              <a:defRPr/>
+            </a:pPr>
+            <a:r>
+              <a:rPr lang="en-GB" baseline="0" dirty="0" smtClean="0"/>
+              <a:t>Well, will be telling if I told you otherwise.</a:t>
+            </a:r>
+          </a:p>
+          <a:p>
+            <a:pPr marL="0" marR="0" indent="0" algn="l" defTabSz="457200" rtl="0" eaLnBrk="1" fontAlgn="auto" latinLnBrk="0" hangingPunct="1">
+              <a:lnSpc>
+                <a:spcPct val="100000"/>
+              </a:lnSpc>
+              <a:spcBef>
+                <a:spcPts val="0"/>
+              </a:spcBef>
+              <a:spcAft>
+                <a:spcPts val="0"/>
+              </a:spcAft>
+              <a:buClrTx/>
+              <a:buSzTx/>
+              <a:buFontTx/>
+              <a:buNone/>
+              <a:tabLst/>
+              <a:defRPr/>
+            </a:pPr>
+            <a:endParaRPr lang="en-GB" baseline="0" dirty="0" smtClean="0"/>
+          </a:p>
+          <a:p>
+            <a:pPr marL="0" marR="0" indent="0" algn="l" defTabSz="457200" rtl="0" eaLnBrk="1" fontAlgn="auto" latinLnBrk="0" hangingPunct="1">
+              <a:lnSpc>
+                <a:spcPct val="100000"/>
+              </a:lnSpc>
+              <a:spcBef>
+                <a:spcPts val="0"/>
+              </a:spcBef>
+              <a:spcAft>
+                <a:spcPts val="0"/>
+              </a:spcAft>
+              <a:buClrTx/>
+              <a:buSzTx/>
+              <a:buFontTx/>
+              <a:buNone/>
+              <a:tabLst/>
+              <a:defRPr/>
+            </a:pPr>
+            <a:r>
+              <a:rPr lang="en-GB" baseline="0" dirty="0" smtClean="0"/>
+              <a:t>I need an assistant, anyone? Not pretty enough/too pretty (will distract from me)</a:t>
+            </a:r>
+          </a:p>
+          <a:p>
+            <a:pPr marL="0" marR="0" indent="0" algn="l" defTabSz="457200" rtl="0" eaLnBrk="1" fontAlgn="auto" latinLnBrk="0" hangingPunct="1">
+              <a:lnSpc>
+                <a:spcPct val="100000"/>
+              </a:lnSpc>
+              <a:spcBef>
+                <a:spcPts val="0"/>
+              </a:spcBef>
+              <a:spcAft>
+                <a:spcPts val="0"/>
+              </a:spcAft>
+              <a:buClrTx/>
+              <a:buSzTx/>
+              <a:buFontTx/>
+              <a:buNone/>
+              <a:tabLst/>
+              <a:defRPr/>
+            </a:pPr>
+            <a:r>
+              <a:rPr lang="en-GB" baseline="0" dirty="0" smtClean="0"/>
+              <a:t>So, now I’m going to introduce you to my assistant: Bill (click)</a:t>
+            </a:r>
+            <a:endParaRPr lang="en-US" dirty="0" smtClean="0"/>
+          </a:p>
+          <a:p>
+            <a:endParaRPr lang="en-US" dirty="0"/>
+          </a:p>
+        </p:txBody>
+      </p:sp>
+      <p:sp>
+        <p:nvSpPr>
+          <p:cNvPr id="4" name="Slide Number Placeholder 3"/>
+          <p:cNvSpPr>
+            <a:spLocks noGrp="1"/>
+          </p:cNvSpPr>
+          <p:nvPr>
+            <p:ph type="sldNum" sz="quarter" idx="10"/>
+          </p:nvPr>
+        </p:nvSpPr>
+        <p:spPr/>
+        <p:txBody>
+          <a:bodyPr/>
+          <a:lstStyle/>
+          <a:p>
+            <a:fld id="{2345002C-B4C8-0744-B509-29A3CA95BDFE}" type="slidenum">
+              <a:rPr lang="en-US" smtClean="0"/>
+              <a:t>17</a:t>
+            </a:fld>
+            <a:endParaRPr lang="en-US"/>
+          </a:p>
+        </p:txBody>
+      </p:sp>
+    </p:spTree>
+    <p:extLst>
+      <p:ext uri="{BB962C8B-B14F-4D97-AF65-F5344CB8AC3E}">
+        <p14:creationId xmlns:p14="http://schemas.microsoft.com/office/powerpoint/2010/main" val="1035665269"/>
       </p:ext>
     </p:extLst>
   </p:cSld>
@@ -1217,116 +1604,26 @@
           <a:bodyPr/>
           <a:lstStyle/>
           <a:p>
-            <a:pPr marL="0" marR="0" indent="0" algn="l" defTabSz="457200" rtl="0" eaLnBrk="1" fontAlgn="auto" latinLnBrk="0" hangingPunct="1">
-              <a:lnSpc>
-                <a:spcPct val="100000"/>
-              </a:lnSpc>
-              <a:spcBef>
-                <a:spcPts val="0"/>
-              </a:spcBef>
-              <a:spcAft>
-                <a:spcPts val="0"/>
-              </a:spcAft>
-              <a:buClrTx/>
-              <a:buSzTx/>
-              <a:buFontTx/>
-              <a:buNone/>
-              <a:tabLst/>
-              <a:defRPr/>
-            </a:pPr>
-            <a:endParaRPr lang="en-GB" baseline="0" dirty="0" smtClean="0"/>
-          </a:p>
-          <a:p>
-            <a:pPr marL="0" marR="0" indent="0" algn="l" defTabSz="457200" rtl="0" eaLnBrk="1" fontAlgn="auto" latinLnBrk="0" hangingPunct="1">
-              <a:lnSpc>
-                <a:spcPct val="100000"/>
-              </a:lnSpc>
-              <a:spcBef>
-                <a:spcPts val="0"/>
-              </a:spcBef>
-              <a:spcAft>
-                <a:spcPts val="0"/>
-              </a:spcAft>
-              <a:buClrTx/>
-              <a:buSzTx/>
-              <a:buFontTx/>
-              <a:buNone/>
-              <a:tabLst/>
-              <a:defRPr/>
-            </a:pPr>
+            <a:r>
+              <a:rPr lang="en-GB" dirty="0" smtClean="0"/>
+              <a:t>Let me introduce you to Bill. He will be helping us on getting this through.</a:t>
+            </a:r>
+          </a:p>
+          <a:p>
+            <a:endParaRPr lang="en-GB" dirty="0" smtClean="0"/>
+          </a:p>
+          <a:p>
+            <a:endParaRPr lang="en-GB" dirty="0" smtClean="0"/>
+          </a:p>
+          <a:p>
+            <a:r>
+              <a:rPr lang="en-GB" dirty="0" smtClean="0"/>
+              <a:t>Say</a:t>
+            </a:r>
             <a:r>
               <a:rPr lang="en-GB" baseline="0" dirty="0" smtClean="0"/>
-              <a:t>Well, will be telling if I told you otherwise.</a:t>
+              <a:t> Hello Bill &lt;click&gt;</a:t>
             </a:r>
-          </a:p>
-          <a:p>
-            <a:pPr marL="0" marR="0" indent="0" algn="l" defTabSz="457200" rtl="0" eaLnBrk="1" fontAlgn="auto" latinLnBrk="0" hangingPunct="1">
-              <a:lnSpc>
-                <a:spcPct val="100000"/>
-              </a:lnSpc>
-              <a:spcBef>
-                <a:spcPts val="0"/>
-              </a:spcBef>
-              <a:spcAft>
-                <a:spcPts val="0"/>
-              </a:spcAft>
-              <a:buClrTx/>
-              <a:buSzTx/>
-              <a:buFontTx/>
-              <a:buNone/>
-              <a:tabLst/>
-              <a:defRPr/>
-            </a:pPr>
-            <a:endParaRPr lang="en-GB" baseline="0" dirty="0" smtClean="0"/>
-          </a:p>
-          <a:p>
-            <a:pPr marL="0" marR="0" indent="0" algn="l" defTabSz="457200" rtl="0" eaLnBrk="1" fontAlgn="auto" latinLnBrk="0" hangingPunct="1">
-              <a:lnSpc>
-                <a:spcPct val="100000"/>
-              </a:lnSpc>
-              <a:spcBef>
-                <a:spcPts val="0"/>
-              </a:spcBef>
-              <a:spcAft>
-                <a:spcPts val="0"/>
-              </a:spcAft>
-              <a:buClrTx/>
-              <a:buSzTx/>
-              <a:buFontTx/>
-              <a:buNone/>
-              <a:tabLst/>
-              <a:defRPr/>
-            </a:pPr>
-            <a:r>
-              <a:rPr lang="en-GB" baseline="0" dirty="0" smtClean="0"/>
-              <a:t>I need an assistant, anyone? Not pretty enough/too pretty (will distract from me)</a:t>
-            </a:r>
-          </a:p>
-          <a:p>
-            <a:pPr marL="0" marR="0" indent="0" algn="l" defTabSz="457200" rtl="0" eaLnBrk="1" fontAlgn="auto" latinLnBrk="0" hangingPunct="1">
-              <a:lnSpc>
-                <a:spcPct val="100000"/>
-              </a:lnSpc>
-              <a:spcBef>
-                <a:spcPts val="0"/>
-              </a:spcBef>
-              <a:spcAft>
-                <a:spcPts val="0"/>
-              </a:spcAft>
-              <a:buClrTx/>
-              <a:buSzTx/>
-              <a:buFontTx/>
-              <a:buNone/>
-              <a:tabLst/>
-              <a:defRPr/>
-            </a:pPr>
-            <a:r>
-              <a:rPr lang="en-GB" baseline="0" dirty="0" smtClean="0"/>
-              <a:t>So, now I’m going to introduce you to my assistant: Bill (click)</a:t>
-            </a:r>
-            <a:endParaRPr lang="en-US" dirty="0" smtClean="0"/>
-          </a:p>
-          <a:p>
             <a:endParaRPr lang="en-US" dirty="0"/>
           </a:p>
         </p:txBody>
@@ -1357,7 +1654,7 @@
     </p:spTree>
     <p:extLst>
       <p:ext uri="{BB962C8B-B14F-4D97-AF65-F5344CB8AC3E}">
-        <p14:creationId xmlns:p14="http://schemas.microsoft.com/office/powerpoint/2010/main" val="1035665269"/>
+        <p14:creationId xmlns:p14="http://schemas.microsoft.com/office/powerpoint/2010/main" val="1108041516"/>
       </p:ext>
     </p:extLst>
   </p:cSld>
@@ -1413,23 +1710,11 @@
           <a:p>
             <a:r>
               <a:rPr lang="en-GB" dirty="0" smtClean="0"/>
-              <a:t>Let me introduce you to Bill. He will be helping us on getting this through.</a:t>
-            </a:r>
-          </a:p>
-          <a:p>
-            <a:endParaRPr lang="en-GB" dirty="0" smtClean="0"/>
-          </a:p>
-          <a:p>
-            <a:endParaRPr lang="en-GB" dirty="0" smtClean="0"/>
-          </a:p>
-          <a:p>
-            <a:r>
-              <a:rPr lang="en-GB" dirty="0" smtClean="0"/>
-              <a:t>Say</a:t>
+              <a:t>Time to</a:t>
             </a:r>
             <a:r>
               <a:rPr lang="en-GB" baseline="0" dirty="0" smtClean="0"/>
-              <a:t> Hello Bill &lt;click&gt;</a:t>
+              <a:t> start working on this &lt;click&gt;</a:t>
             </a:r>
             <a:endParaRPr lang="en-US" dirty="0"/>
           </a:p>
@@ -1461,7 +1746,7 @@
     </p:spTree>
     <p:extLst>
       <p:ext uri="{BB962C8B-B14F-4D97-AF65-F5344CB8AC3E}">
-        <p14:creationId xmlns:p14="http://schemas.microsoft.com/office/powerpoint/2010/main" val="1108041516"/>
+        <p14:creationId xmlns:p14="http://schemas.microsoft.com/office/powerpoint/2010/main" val="277764061"/>
       </p:ext>
     </p:extLst>
   </p:cSld>
@@ -1517,13 +1802,45 @@
           <a:p>
             <a:r>
               <a:rPr lang="en-GB" dirty="0" smtClean="0"/>
-              <a:t>Time to</a:t>
+              <a:t>Today we are</a:t>
             </a:r>
             <a:r>
               <a:rPr lang="en-GB" baseline="0" dirty="0" smtClean="0"/>
-              <a:t> start working on this &lt;click&gt;</a:t>
+              <a:t> actually going to be talking about &lt;click&gt;</a:t>
             </a:r>
-            <a:endParaRPr lang="en-US" dirty="0"/>
+          </a:p>
+          <a:p>
+            <a:endParaRPr lang="en-GB" baseline="0" dirty="0" smtClean="0"/>
+          </a:p>
+          <a:p>
+            <a:r>
+              <a:rPr lang="en-GB" baseline="0" dirty="0" smtClean="0"/>
+              <a:t>Cakes!!</a:t>
+            </a:r>
+          </a:p>
+          <a:p>
+            <a:endParaRPr lang="en-GB" baseline="0" dirty="0" smtClean="0"/>
+          </a:p>
+          <a:p>
+            <a:r>
+              <a:rPr lang="en-GB" baseline="0" dirty="0" smtClean="0"/>
+              <a:t>Actually, sorry, no, Bill &lt;click&gt;</a:t>
+            </a:r>
+          </a:p>
+          <a:p>
+            <a:endParaRPr lang="en-GB" baseline="0" dirty="0" smtClean="0"/>
+          </a:p>
+          <a:p>
+            <a:r>
+              <a:rPr lang="en-GB" baseline="0" dirty="0" smtClean="0"/>
+              <a:t>Today we are going to talking about software &lt;click&gt;</a:t>
+            </a:r>
+          </a:p>
+          <a:p>
+            <a:r>
+              <a:rPr lang="en-GB" baseline="0" dirty="0" smtClean="0"/>
+              <a:t>And how we create/design/despair</a:t>
+            </a:r>
           </a:p>
         </p:txBody>
       </p:sp>
@@ -1553,7 +1870,7 @@
     </p:spTree>
     <p:extLst>
       <p:ext uri="{BB962C8B-B14F-4D97-AF65-F5344CB8AC3E}">
-        <p14:creationId xmlns:p14="http://schemas.microsoft.com/office/powerpoint/2010/main" val="277764061"/>
+        <p14:creationId xmlns:p14="http://schemas.microsoft.com/office/powerpoint/2010/main" val="2923852172"/>
       </p:ext>
     </p:extLst>
   </p:cSld>
@@ -1609,11 +1926,11 @@
           <a:p>
             <a:r>
               <a:rPr lang="en-GB" dirty="0" smtClean="0"/>
-              <a:t>Today we are</a:t>
+              <a:t>The first thing that</a:t>
             </a:r>
             <a:r>
               <a:rPr lang="en-GB" baseline="0" dirty="0" smtClean="0"/>
-              <a:t> actually going to be talking about &lt;click&gt;</a:t>
+              <a:t> we need is always to make something work. How it works is not as important. Make it run, make it right, make it fast (Douglas Kent Beck, who just passed away)&lt;click&gt;</a:t>
             </a:r>
           </a:p>
           <a:p>
@@ -1622,7 +1939,7 @@
           <a:p>
             <a:r>
               <a:rPr lang="en-GB" baseline="0" dirty="0" smtClean="0"/>
-              <a:t>Cakes!!</a:t>
+              <a:t>So, how we do achieve that? &lt;click&gt;</a:t>
             </a:r>
           </a:p>
           <a:p>
@@ -1631,7 +1948,7 @@
           <a:p>
             <a:r>
               <a:rPr lang="en-GB" baseline="0" dirty="0" smtClean="0"/>
-              <a:t>Actually, sorry, no, Bill &lt;click&gt;</a:t>
+              <a:t>Well, we can just create a single thing (be either class or object) &lt;click&gt;</a:t>
             </a:r>
           </a:p>
           <a:p>
@@ -1640,22 +1957,37 @@
           <a:p>
             <a:r>
               <a:rPr lang="en-GB" baseline="0" dirty="0" smtClean="0"/>
-              <a:t>Today we are going to talking about software &lt;click&gt;</a:t>
+              <a:t>That we will put together with all the functionality&lt;click&gt;</a:t>
             </a:r>
+          </a:p>
+          <a:p>
+            <a:endParaRPr lang="en-GB" baseline="0" dirty="0" smtClean="0"/>
           </a:p>
           <a:p>
             <a:r>
               <a:rPr lang="en-GB" baseline="0" dirty="0" smtClean="0"/>
-              <a:t>And how </a:t>
+              <a:t>But of course. This is problematic. You know, a monolith is more difficult to change, more difficult to </a:t>
+            </a:r>
+            <a:r>
+              <a:rPr lang="en-GB" baseline="0" dirty="0" err="1" smtClean="0"/>
+              <a:t>imrpove</a:t>
             </a:r>
             <a:r>
               <a:rPr lang="en-GB" baseline="0" dirty="0" smtClean="0"/>
-              <a:t>we </a:t>
+              <a:t>, more difficult to scale?&lt;click&gt;</a:t>
             </a:r>
+          </a:p>
+          <a:p>
+            <a:endParaRPr lang="en-GB" baseline="0" dirty="0" smtClean="0"/>
+          </a:p>
+          <a:p>
             <a:r>
               <a:rPr lang="en-GB" baseline="0" dirty="0" smtClean="0"/>
-              <a:t>create/design/despair</a:t>
+              <a:t>DHH – Majestic monolith (yesterday) – Good for small teams/small codebases. We already doing distributed computing.</a:t>
             </a:r>
+          </a:p>
+          <a:p>
+            <a:endParaRPr lang="en-GB" baseline="0" dirty="0" smtClean="0"/>
           </a:p>
         </p:txBody>
       </p:sp>
@@ -1685,7 +2017,7 @@
     </p:spTree>
     <p:extLst>
       <p:ext uri="{BB962C8B-B14F-4D97-AF65-F5344CB8AC3E}">
-        <p14:creationId xmlns:p14="http://schemas.microsoft.com/office/powerpoint/2010/main" val="2923852172"/>
+        <p14:creationId xmlns:p14="http://schemas.microsoft.com/office/powerpoint/2010/main" val="796270880"/>
       </p:ext>
     </p:extLst>
   </p:cSld>
@@ -1739,87 +2071,30 @@
           <a:bodyPr/>
           <a:lstStyle/>
           <a:p>
-            <a:r>
-              <a:rPr lang="en-GB" dirty="0" smtClean="0"/>
-              <a:t>The first thing that</a:t>
-            </a:r>
+            <a:pPr marL="0" marR="0" indent="0" algn="l" defTabSz="457200" rtl="0" eaLnBrk="1" fontAlgn="auto" latinLnBrk="0" hangingPunct="1">
+              <a:lnSpc>
+                <a:spcPct val="100000"/>
+              </a:lnSpc>
+              <a:spcBef>
+                <a:spcPts val="0"/>
+              </a:spcBef>
+              <a:spcAft>
+                <a:spcPts val="0"/>
+              </a:spcAft>
+              <a:buClrTx/>
+              <a:buSzTx/>
+              <a:buFontTx/>
+              <a:buNone/>
+              <a:tabLst/>
+              <a:defRPr/>
+            </a:pPr>
             <a:r>
               <a:rPr lang="en-GB" baseline="0" dirty="0" smtClean="0"/>
-              <a:t> we need is always to make something work. How it works is not as important. </a:t>
+              <a:t>Then what can we do? &lt;click&gt;</a:t>
             </a:r>
-            <a:r>
-              <a:rPr lang="en-GB" baseline="0" dirty="0" smtClean="0"/>
-              <a:t>Make it run, make it right, make it fast (Douglas Kent Beck, who just passed away)&lt;</a:t>
-            </a:r>
-            <a:r>
-              <a:rPr lang="en-GB" baseline="0" dirty="0" smtClean="0"/>
-              <a:t>click&gt;</a:t>
-            </a:r>
-          </a:p>
-          <a:p>
-            <a:endParaRPr lang="en-GB" baseline="0" dirty="0" smtClean="0"/>
-          </a:p>
-          <a:p>
-            <a:r>
-              <a:rPr lang="en-GB" baseline="0" dirty="0" smtClean="0"/>
-              <a:t>So, how we do achieve that? &lt;click&gt;</a:t>
-            </a:r>
-          </a:p>
-          <a:p>
-            <a:endParaRPr lang="en-GB" baseline="0" dirty="0" smtClean="0"/>
-          </a:p>
-          <a:p>
-            <a:r>
-              <a:rPr lang="en-GB" baseline="0" dirty="0" smtClean="0"/>
-              <a:t>Well, we can just create a single thing (be either class or object) &lt;click&gt;</a:t>
-            </a:r>
-          </a:p>
-          <a:p>
-            <a:endParaRPr lang="en-GB" baseline="0" dirty="0" smtClean="0"/>
-          </a:p>
-          <a:p>
-            <a:r>
-              <a:rPr lang="en-GB" baseline="0" dirty="0" smtClean="0"/>
-              <a:t>That we will put together with all the functionality&lt;click&gt;</a:t>
-            </a:r>
-          </a:p>
-          <a:p>
-            <a:endParaRPr lang="en-GB" baseline="0" dirty="0" smtClean="0"/>
-          </a:p>
-          <a:p>
-            <a:r>
-              <a:rPr lang="en-GB" baseline="0" dirty="0" smtClean="0"/>
-              <a:t>But of course. This is problematic. You know, a monolith is more difficult to change, more difficult to </a:t>
-            </a:r>
-            <a:r>
-              <a:rPr lang="en-GB" baseline="0" dirty="0" err="1" smtClean="0"/>
-              <a:t>imrpove</a:t>
-            </a:r>
-            <a:r>
-              <a:rPr lang="en-GB" baseline="0" dirty="0" smtClean="0"/>
-              <a:t>, more difficult to scale?&lt;</a:t>
-            </a:r>
-            <a:r>
-              <a:rPr lang="en-GB" baseline="0" dirty="0" smtClean="0"/>
-              <a:t>click</a:t>
-            </a:r>
-            <a:r>
-              <a:rPr lang="en-GB" baseline="0" dirty="0" smtClean="0"/>
-              <a:t>&gt;</a:t>
-            </a:r>
-          </a:p>
-          <a:p>
-            <a:endParaRPr lang="en-GB" baseline="0" dirty="0" smtClean="0"/>
-          </a:p>
-          <a:p>
-            <a:r>
-              <a:rPr lang="en-GB" baseline="0" dirty="0" smtClean="0"/>
-              <a:t>DHH – Majestic monolith (yesterday) – Good for small teams/small codebases. We already doing distributed computing.</a:t>
-            </a:r>
-            <a:endParaRPr lang="en-GB" baseline="0" dirty="0" smtClean="0"/>
-          </a:p>
-          <a:p>
-            <a:endParaRPr lang="en-GB" baseline="0" dirty="0" smtClean="0"/>
+          </a:p>
+          <a:p>
+            <a:endParaRPr lang="en-US" dirty="0"/>
           </a:p>
         </p:txBody>
       </p:sp>
@@ -1849,7 +2124,7 @@
     </p:spTree>
     <p:extLst>
       <p:ext uri="{BB962C8B-B14F-4D97-AF65-F5344CB8AC3E}">
-        <p14:creationId xmlns:p14="http://schemas.microsoft.com/office/powerpoint/2010/main" val="796270880"/>
+        <p14:creationId xmlns:p14="http://schemas.microsoft.com/office/powerpoint/2010/main" val="2849295536"/>
       </p:ext>
     </p:extLst>
   </p:cSld>
@@ -1903,29 +2178,14 @@
           <a:bodyPr/>
           <a:lstStyle/>
           <a:p>
-            <a:pPr marL="0" marR="0" indent="0" algn="l" defTabSz="457200" rtl="0" eaLnBrk="1" fontAlgn="auto" latinLnBrk="0" hangingPunct="1">
-              <a:lnSpc>
-                <a:spcPct val="100000"/>
-              </a:lnSpc>
-              <a:spcBef>
-                <a:spcPts val="0"/>
-              </a:spcBef>
-              <a:spcAft>
-                <a:spcPts val="0"/>
-              </a:spcAft>
-              <a:buClrTx/>
-              <a:buSzTx/>
-              <a:buFontTx/>
-              <a:buNone/>
-              <a:tabLst/>
-              <a:defRPr/>
-            </a:pPr>
             <a:r>
-              <a:rPr lang="en-GB" baseline="0" dirty="0" smtClean="0"/>
-              <a:t>Then what can we do? &lt;click&gt;</a:t>
+              <a:rPr lang="en-US" dirty="0" smtClean="0"/>
+              <a:t>A nice a</a:t>
             </a:r>
-          </a:p>
-          <a:p>
+            <a:r>
+              <a:rPr lang="en-US" baseline="0" dirty="0" smtClean="0"/>
+              <a:t> layered cake, looks more tasty</a:t>
+            </a:r>
             <a:endParaRPr lang="en-US" dirty="0"/>
           </a:p>
         </p:txBody>
@@ -1956,7 +2216,7 @@
     </p:spTree>
     <p:extLst>
       <p:ext uri="{BB962C8B-B14F-4D97-AF65-F5344CB8AC3E}">
-        <p14:creationId xmlns:p14="http://schemas.microsoft.com/office/powerpoint/2010/main" val="2849295536"/>
+        <p14:creationId xmlns:p14="http://schemas.microsoft.com/office/powerpoint/2010/main" val="1797592551"/>
       </p:ext>
     </p:extLst>
   </p:cSld>
@@ -2012,11 +2272,128 @@
           <a:p>
             <a:r>
               <a:rPr lang="en-US" dirty="0" smtClean="0"/>
-              <a:t>A nice a</a:t>
+              <a:t>Controller</a:t>
+            </a:r>
+            <a:endParaRPr lang="en-US" baseline="0" dirty="0" smtClean="0"/>
+          </a:p>
+          <a:p>
+            <a:endParaRPr lang="en-US" baseline="0" dirty="0" smtClean="0"/>
+          </a:p>
+          <a:p>
+            <a:r>
+              <a:rPr lang="en-US" baseline="0" dirty="0" smtClean="0"/>
+              <a:t>Business Logic</a:t>
+            </a:r>
+          </a:p>
+          <a:p>
+            <a:endParaRPr lang="en-US" baseline="0" dirty="0" smtClean="0"/>
+          </a:p>
+          <a:p>
+            <a:r>
+              <a:rPr lang="en-US" baseline="0" dirty="0" smtClean="0"/>
+              <a:t>Adapter</a:t>
+            </a:r>
+          </a:p>
+          <a:p>
+            <a:endParaRPr lang="en-US" baseline="0" dirty="0" smtClean="0"/>
+          </a:p>
+          <a:p>
+            <a:r>
+              <a:rPr lang="en-US" baseline="0" dirty="0" smtClean="0"/>
+              <a:t>Data</a:t>
+            </a:r>
+          </a:p>
+          <a:p>
+            <a:endParaRPr lang="en-US" baseline="0" dirty="0" smtClean="0"/>
+          </a:p>
+          <a:p>
+            <a:r>
+              <a:rPr lang="en-US" baseline="0" dirty="0" smtClean="0"/>
+              <a:t>Going back to the fruit cake</a:t>
+            </a:r>
+          </a:p>
+          <a:p>
+            <a:endParaRPr lang="en-US" baseline="0" dirty="0" smtClean="0"/>
+          </a:p>
+          <a:p>
+            <a:r>
+              <a:rPr lang="en-US" baseline="0" dirty="0" smtClean="0"/>
+              <a:t>Usually setup as separate classes/projects.</a:t>
+            </a:r>
+          </a:p>
+          <a:p>
+            <a:endParaRPr lang="en-US" baseline="0" dirty="0" smtClean="0"/>
+          </a:p>
+          <a:p>
+            <a:r>
+              <a:rPr lang="en-US" baseline="0" dirty="0" smtClean="0"/>
+              <a:t>Lets see an example!!</a:t>
+            </a:r>
+          </a:p>
+          <a:p>
+            <a:endParaRPr lang="en-US" baseline="0" dirty="0" smtClean="0"/>
+          </a:p>
+          <a:p>
+            <a:endParaRPr lang="en-US" baseline="0" dirty="0" smtClean="0"/>
+          </a:p>
+          <a:p>
+            <a:r>
+              <a:rPr lang="en-US" baseline="0" dirty="0" smtClean="0"/>
+              <a:t>But if we use layers, the objects that deal with a layer do they need to know what is below them?</a:t>
+            </a:r>
+          </a:p>
+          <a:p>
+            <a:r>
+              <a:rPr lang="en-US" baseline="0" dirty="0" err="1" smtClean="0"/>
+              <a:t>Owin</a:t>
             </a:r>
             <a:r>
               <a:rPr lang="en-US" baseline="0" dirty="0" smtClean="0"/>
-              <a:t> layered cake, looks more tasty</a:t>
+              <a:t> middleware how to deal with it kind of nicely. Static language is on the way.</a:t>
+            </a:r>
+          </a:p>
+          <a:p>
+            <a:endParaRPr lang="en-US" baseline="0" dirty="0" smtClean="0"/>
+          </a:p>
+          <a:p>
+            <a:endParaRPr lang="en-US" baseline="0" dirty="0" smtClean="0"/>
+          </a:p>
+          <a:p>
+            <a:r>
+              <a:rPr lang="en-US" baseline="0" dirty="0" smtClean="0"/>
+              <a:t>But what happens when we need to add a new endpoint, or modify or improve one of the others?</a:t>
+            </a:r>
+          </a:p>
+          <a:p>
+            <a:endParaRPr lang="en-US" baseline="0" dirty="0" smtClean="0"/>
+          </a:p>
+          <a:p>
+            <a:r>
+              <a:rPr lang="en-US" baseline="0" dirty="0" smtClean="0"/>
+              <a:t>But layers are logical, not the actual separation of projects on your code.</a:t>
+            </a:r>
+          </a:p>
+          <a:p>
+            <a:endParaRPr lang="en-US" dirty="0" smtClean="0"/>
+          </a:p>
+          <a:p>
+            <a:endParaRPr lang="en-US" dirty="0" smtClean="0"/>
+          </a:p>
+          <a:p>
+            <a:endParaRPr lang="en-US" dirty="0" smtClean="0"/>
+          </a:p>
+          <a:p>
+            <a:r>
+              <a:rPr lang="en-US" dirty="0" smtClean="0"/>
+              <a:t>Show </a:t>
+            </a:r>
+            <a:r>
+              <a:rPr lang="en-US" dirty="0" err="1" smtClean="0"/>
+              <a:t>Promocode</a:t>
+            </a:r>
+            <a:r>
+              <a:rPr lang="en-US" dirty="0" smtClean="0"/>
+              <a:t> before any change</a:t>
             </a:r>
             <a:endParaRPr lang="en-US" dirty="0"/>
           </a:p>
@@ -2048,7 +2425,7 @@
     </p:spTree>
     <p:extLst>
       <p:ext uri="{BB962C8B-B14F-4D97-AF65-F5344CB8AC3E}">
-        <p14:creationId xmlns:p14="http://schemas.microsoft.com/office/powerpoint/2010/main" val="1797592551"/>
+        <p14:creationId xmlns:p14="http://schemas.microsoft.com/office/powerpoint/2010/main" val="748940058"/>
       </p:ext>
     </p:extLst>
   </p:cSld>
@@ -2104,132 +2481,11 @@
           <a:p>
             <a:r>
               <a:rPr lang="en-US" dirty="0" smtClean="0"/>
-              <a:t>Controller</a:t>
-            </a:r>
-            <a:endParaRPr lang="en-US" baseline="0" dirty="0" smtClean="0"/>
-          </a:p>
-          <a:p>
-            <a:endParaRPr lang="en-US" baseline="0" dirty="0" smtClean="0"/>
-          </a:p>
-          <a:p>
-            <a:r>
-              <a:rPr lang="en-US" baseline="0" dirty="0" smtClean="0"/>
-              <a:t>Business Logic</a:t>
-            </a:r>
-          </a:p>
-          <a:p>
-            <a:endParaRPr lang="en-US" baseline="0" dirty="0" smtClean="0"/>
-          </a:p>
-          <a:p>
-            <a:r>
-              <a:rPr lang="en-US" baseline="0" dirty="0" smtClean="0"/>
-              <a:t>Adapter</a:t>
-            </a:r>
-          </a:p>
-          <a:p>
-            <a:endParaRPr lang="en-US" baseline="0" dirty="0" smtClean="0"/>
-          </a:p>
-          <a:p>
-            <a:r>
-              <a:rPr lang="en-US" baseline="0" dirty="0" smtClean="0"/>
-              <a:t>Data</a:t>
-            </a:r>
-          </a:p>
-          <a:p>
-            <a:endParaRPr lang="en-US" baseline="0" dirty="0" smtClean="0"/>
-          </a:p>
-          <a:p>
-            <a:r>
-              <a:rPr lang="en-US" baseline="0" dirty="0" smtClean="0"/>
-              <a:t>Going back to the fruit cake</a:t>
-            </a:r>
-          </a:p>
-          <a:p>
-            <a:endParaRPr lang="en-US" baseline="0" dirty="0" smtClean="0"/>
-          </a:p>
-          <a:p>
-            <a:r>
-              <a:rPr lang="en-US" baseline="0" dirty="0" smtClean="0"/>
-              <a:t>Usually setup as separate </a:t>
+              <a:t>Another way of looking at this. What if you want one</a:t>
             </a:r>
             <a:r>
               <a:rPr lang="en-US" baseline="0" dirty="0" smtClean="0"/>
-              <a:t>classes/projects.</a:t>
-            </a:r>
-          </a:p>
-          <a:p>
-            <a:endParaRPr lang="en-US" baseline="0" dirty="0" smtClean="0"/>
-          </a:p>
-          <a:p>
-            <a:r>
-              <a:rPr lang="en-US" baseline="0" dirty="0" smtClean="0"/>
-              <a:t>Lets see an example!!</a:t>
-            </a:r>
-          </a:p>
-          <a:p>
-            <a:endParaRPr lang="en-US" baseline="0" dirty="0" smtClean="0"/>
-          </a:p>
-          <a:p>
-            <a:endParaRPr lang="en-US" baseline="0" dirty="0" smtClean="0"/>
-          </a:p>
-          <a:p>
-            <a:r>
-              <a:rPr lang="en-US" baseline="0" dirty="0" smtClean="0"/>
-              <a:t>But if we use layers, the objects that deal with a layer do they need to know what is below them?</a:t>
-            </a:r>
-          </a:p>
-          <a:p>
-            <a:r>
-              <a:rPr lang="en-US" baseline="0" dirty="0" err="1" smtClean="0"/>
-              <a:t>Owin</a:t>
-            </a:r>
-            <a:r>
-              <a:rPr lang="en-US" baseline="0" dirty="0" smtClean="0"/>
-              <a:t> middleware how to deal with it kind of nicely. Static language is on the way.</a:t>
-            </a:r>
-          </a:p>
-          <a:p>
-            <a:endParaRPr lang="en-US" baseline="0" dirty="0" smtClean="0"/>
-          </a:p>
-          <a:p>
-            <a:endParaRPr lang="en-US" baseline="0" dirty="0" smtClean="0"/>
-          </a:p>
-          <a:p>
-            <a:r>
-              <a:rPr lang="en-US" baseline="0" dirty="0" smtClean="0"/>
-              <a:t>But what happens when we need to add a new endpoint, or modify or improve one of the others?</a:t>
-            </a:r>
-          </a:p>
-          <a:p>
-            <a:endParaRPr lang="en-US" baseline="0" dirty="0" smtClean="0"/>
-          </a:p>
-          <a:p>
-            <a:r>
-              <a:rPr lang="en-US" baseline="0" dirty="0" smtClean="0"/>
-              <a:t>But layers are logical, not the actual separation of projects on your code.</a:t>
-            </a:r>
-          </a:p>
-          <a:p>
-            <a:endParaRPr lang="en-US" dirty="0" smtClean="0"/>
-          </a:p>
-          <a:p>
-            <a:endParaRPr lang="en-US" dirty="0" smtClean="0"/>
-          </a:p>
-          <a:p>
-            <a:endParaRPr lang="en-US" dirty="0" smtClean="0"/>
-          </a:p>
-          <a:p>
-            <a:r>
-              <a:rPr lang="en-US" dirty="0" smtClean="0"/>
-              <a:t>Show </a:t>
-            </a:r>
-            <a:r>
-              <a:rPr lang="en-US" dirty="0" err="1" smtClean="0"/>
-              <a:t>Promocode</a:t>
-            </a:r>
-            <a:r>
-              <a:rPr lang="en-US" dirty="0" smtClean="0"/>
-              <a:t> before any change</a:t>
+              <a:t> slice to be different to the rest?</a:t>
             </a:r>
             <a:endParaRPr lang="en-US" dirty="0"/>
           </a:p>
@@ -2261,7 +2517,7 @@
     </p:spTree>
     <p:extLst>
       <p:ext uri="{BB962C8B-B14F-4D97-AF65-F5344CB8AC3E}">
-        <p14:creationId xmlns:p14="http://schemas.microsoft.com/office/powerpoint/2010/main" val="748940058"/>
+        <p14:creationId xmlns:p14="http://schemas.microsoft.com/office/powerpoint/2010/main" val="1797592551"/>
       </p:ext>
     </p:extLst>
   </p:cSld>
@@ -2554,7 +2810,7 @@
           <a:p>
             <a:fld id="{B01F9CA3-105E-4857-9057-6DB6197DA786}" type="datetimeFigureOut">
               <a:rPr lang="en-US" smtClean="0"/>
-              <a:t>27/02/16</a:t>
+              <a:t>14/03/16</a:t>
             </a:fld>
             <a:endParaRPr lang="en-US"/>
           </a:p>
@@ -2746,7 +3002,7 @@
           <a:p>
             <a:fld id="{B01F9CA3-105E-4857-9057-6DB6197DA786}" type="datetimeFigureOut">
               <a:rPr lang="en-US" smtClean="0"/>
-              <a:t>27/02/16</a:t>
+              <a:t>14/03/16</a:t>
             </a:fld>
             <a:endParaRPr lang="en-US"/>
           </a:p>
@@ -3015,7 +3271,7 @@
           <a:p>
             <a:fld id="{B01F9CA3-105E-4857-9057-6DB6197DA786}" type="datetimeFigureOut">
               <a:rPr lang="en-US" smtClean="0"/>
-              <a:t>27/02/16</a:t>
+              <a:t>14/03/16</a:t>
             </a:fld>
             <a:endParaRPr lang="en-US"/>
           </a:p>
@@ -3194,7 +3450,7 @@
           <a:p>
             <a:fld id="{B01F9CA3-105E-4857-9057-6DB6197DA786}" type="datetimeFigureOut">
               <a:rPr lang="en-US" smtClean="0"/>
-              <a:t>27/02/16</a:t>
+              <a:t>14/03/16</a:t>
             </a:fld>
             <a:endParaRPr lang="en-US"/>
           </a:p>
@@ -3363,7 +3619,7 @@
           <a:p>
             <a:fld id="{B01F9CA3-105E-4857-9057-6DB6197DA786}" type="datetimeFigureOut">
               <a:rPr lang="en-US" smtClean="0"/>
-              <a:t>27/02/16</a:t>
+              <a:t>14/03/16</a:t>
             </a:fld>
             <a:endParaRPr lang="en-US"/>
           </a:p>
@@ -3605,7 +3861,7 @@
           <a:p>
             <a:fld id="{B01F9CA3-105E-4857-9057-6DB6197DA786}" type="datetimeFigureOut">
               <a:rPr lang="en-US" smtClean="0"/>
-              <a:t>27/02/16</a:t>
+              <a:t>14/03/16</a:t>
             </a:fld>
             <a:endParaRPr lang="en-US"/>
           </a:p>
@@ -3928,7 +4184,7 @@
           <a:p>
             <a:fld id="{B01F9CA3-105E-4857-9057-6DB6197DA786}" type="datetimeFigureOut">
               <a:rPr lang="en-US" smtClean="0"/>
-              <a:t>27/02/16</a:t>
+              <a:t>14/03/16</a:t>
             </a:fld>
             <a:endParaRPr lang="en-US"/>
           </a:p>
@@ -4226,7 +4482,7 @@
           <a:p>
             <a:fld id="{B01F9CA3-105E-4857-9057-6DB6197DA786}" type="datetimeFigureOut">
               <a:rPr lang="en-US" smtClean="0"/>
-              <a:t>27/02/16</a:t>
+              <a:t>14/03/16</a:t>
             </a:fld>
             <a:endParaRPr lang="en-US"/>
           </a:p>
@@ -4682,7 +4938,7 @@
           <a:p>
             <a:fld id="{B01F9CA3-105E-4857-9057-6DB6197DA786}" type="datetimeFigureOut">
               <a:rPr lang="en-US" smtClean="0"/>
-              <a:t>27/02/16</a:t>
+              <a:t>14/03/16</a:t>
             </a:fld>
             <a:endParaRPr lang="en-US"/>
           </a:p>
@@ -4795,7 +5051,7 @@
           <a:p>
             <a:fld id="{B01F9CA3-105E-4857-9057-6DB6197DA786}" type="datetimeFigureOut">
               <a:rPr lang="en-US" smtClean="0"/>
-              <a:t>27/02/16</a:t>
+              <a:t>14/03/16</a:t>
             </a:fld>
             <a:endParaRPr lang="en-US"/>
           </a:p>
@@ -4885,7 +5141,7 @@
           <a:p>
             <a:fld id="{B01F9CA3-105E-4857-9057-6DB6197DA786}" type="datetimeFigureOut">
               <a:rPr lang="en-US" smtClean="0"/>
-              <a:t>27/02/16</a:t>
+              <a:t>14/03/16</a:t>
             </a:fld>
             <a:endParaRPr lang="en-US"/>
           </a:p>
@@ -5167,7 +5423,7 @@
           <a:p>
             <a:fld id="{B01F9CA3-105E-4857-9057-6DB6197DA786}" type="datetimeFigureOut">
               <a:rPr lang="en-US" smtClean="0"/>
-              <a:t>27/02/16</a:t>
+              <a:t>14/03/16</a:t>
             </a:fld>
             <a:endParaRPr lang="en-US"/>
           </a:p>
@@ -5373,7 +5629,7 @@
           <a:p>
             <a:fld id="{B01F9CA3-105E-4857-9057-6DB6197DA786}" type="datetimeFigureOut">
               <a:rPr lang="en-US" smtClean="0"/>
-              <a:t>27/02/16</a:t>
+              <a:t>14/03/16</a:t>
             </a:fld>
             <a:endParaRPr lang="en-US"/>
           </a:p>
@@ -11465,6 +11721,434 @@
       </p:grpSpPr>
       <p:pic>
         <p:nvPicPr>
+          <p:cNvPr id="5" name="Thinking Bill"/>
+          <p:cNvPicPr>
+            <a:picLocks noChangeAspect="1"/>
+          </p:cNvPicPr>
+          <p:nvPr/>
+        </p:nvPicPr>
+        <p:blipFill>
+          <a:blip r:embed="rId3" cstate="email">
+            <a:extLst>
+              <a:ext uri="{28A0092B-C50C-407E-A947-70E740481C1C}">
+                <a14:useLocalDpi xmlns:a14="http://schemas.microsoft.com/office/drawing/2010/main" val="0"/>
+              </a:ext>
+            </a:extLst>
+          </a:blip>
+          <a:stretch>
+            <a:fillRect/>
+          </a:stretch>
+        </p:blipFill>
+        <p:spPr>
+          <a:xfrm>
+            <a:off x="-184830" y="2539686"/>
+            <a:ext cx="3962400" cy="2971800"/>
+          </a:xfrm>
+          <a:prstGeom prst="rect">
+            <a:avLst/>
+          </a:prstGeom>
+        </p:spPr>
+      </p:pic>
+      <p:pic>
+        <p:nvPicPr>
+          <p:cNvPr id="9" name="Basic Bill"/>
+          <p:cNvPicPr>
+            <a:picLocks noChangeAspect="1"/>
+          </p:cNvPicPr>
+          <p:nvPr/>
+        </p:nvPicPr>
+        <p:blipFill>
+          <a:blip r:embed="rId4" cstate="email">
+            <a:extLst>
+              <a:ext uri="{28A0092B-C50C-407E-A947-70E740481C1C}">
+                <a14:useLocalDpi xmlns:a14="http://schemas.microsoft.com/office/drawing/2010/main" val="0"/>
+              </a:ext>
+            </a:extLst>
+          </a:blip>
+          <a:stretch>
+            <a:fillRect/>
+          </a:stretch>
+        </p:blipFill>
+        <p:spPr>
+          <a:xfrm>
+            <a:off x="-184830" y="2539686"/>
+            <a:ext cx="3962400" cy="2971800"/>
+          </a:xfrm>
+          <a:prstGeom prst="rect">
+            <a:avLst/>
+          </a:prstGeom>
+        </p:spPr>
+      </p:pic>
+      <p:sp>
+        <p:nvSpPr>
+          <p:cNvPr id="2" name="Explosion 1 1"/>
+          <p:cNvSpPr/>
+          <p:nvPr/>
+        </p:nvSpPr>
+        <p:spPr>
+          <a:xfrm>
+            <a:off x="4108102" y="0"/>
+            <a:ext cx="4564558" cy="3412878"/>
+          </a:xfrm>
+          <a:prstGeom prst="irregularSeal1">
+            <a:avLst/>
+          </a:prstGeom>
+        </p:spPr>
+        <p:style>
+          <a:lnRef idx="1">
+            <a:schemeClr val="accent6"/>
+          </a:lnRef>
+          <a:fillRef idx="2">
+            <a:schemeClr val="accent6"/>
+          </a:fillRef>
+          <a:effectRef idx="1">
+            <a:schemeClr val="accent6"/>
+          </a:effectRef>
+          <a:fontRef idx="minor">
+            <a:schemeClr val="dk1"/>
+          </a:fontRef>
+        </p:style>
+        <p:txBody>
+          <a:bodyPr rtlCol="0" anchor="ctr"/>
+          <a:lstStyle/>
+          <a:p>
+            <a:pPr algn="ctr"/>
+            <a:r>
+              <a:rPr lang="en-US" sz="3200" dirty="0" smtClean="0">
+                <a:solidFill>
+                  <a:schemeClr val="bg1"/>
+                </a:solidFill>
+              </a:rPr>
+              <a:t>Duplication</a:t>
+            </a:r>
+            <a:endParaRPr lang="en-US" sz="3200" dirty="0">
+              <a:solidFill>
+                <a:schemeClr val="bg1"/>
+              </a:solidFill>
+            </a:endParaRPr>
+          </a:p>
+        </p:txBody>
+      </p:sp>
+      <p:sp>
+        <p:nvSpPr>
+          <p:cNvPr id="3" name="Explosion 1 2"/>
+          <p:cNvSpPr/>
+          <p:nvPr/>
+        </p:nvSpPr>
+        <p:spPr>
+          <a:xfrm>
+            <a:off x="4440521" y="3115243"/>
+            <a:ext cx="4564558" cy="3412878"/>
+          </a:xfrm>
+          <a:prstGeom prst="irregularSeal1">
+            <a:avLst/>
+          </a:prstGeom>
+        </p:spPr>
+        <p:style>
+          <a:lnRef idx="1">
+            <a:schemeClr val="accent3"/>
+          </a:lnRef>
+          <a:fillRef idx="2">
+            <a:schemeClr val="accent3"/>
+          </a:fillRef>
+          <a:effectRef idx="1">
+            <a:schemeClr val="accent3"/>
+          </a:effectRef>
+          <a:fontRef idx="minor">
+            <a:schemeClr val="dk1"/>
+          </a:fontRef>
+        </p:style>
+        <p:txBody>
+          <a:bodyPr rtlCol="0" anchor="ctr"/>
+          <a:lstStyle/>
+          <a:p>
+            <a:pPr algn="ctr"/>
+            <a:r>
+              <a:rPr lang="en-US" sz="3200" dirty="0" smtClean="0">
+                <a:solidFill>
+                  <a:schemeClr val="bg1"/>
+                </a:solidFill>
+              </a:rPr>
+              <a:t>Granularity</a:t>
+            </a:r>
+            <a:endParaRPr lang="en-US" sz="3200" dirty="0">
+              <a:solidFill>
+                <a:schemeClr val="bg1"/>
+              </a:solidFill>
+            </a:endParaRPr>
+          </a:p>
+        </p:txBody>
+      </p:sp>
+      <p:sp>
+        <p:nvSpPr>
+          <p:cNvPr id="10" name="TextBox 9"/>
+          <p:cNvSpPr txBox="1"/>
+          <p:nvPr/>
+        </p:nvSpPr>
+        <p:spPr>
+          <a:xfrm>
+            <a:off x="-3614615" y="3595077"/>
+            <a:ext cx="184666" cy="369332"/>
+          </a:xfrm>
+          <a:prstGeom prst="rect">
+            <a:avLst/>
+          </a:prstGeom>
+          <a:noFill/>
+        </p:spPr>
+        <p:txBody>
+          <a:bodyPr wrap="none" rtlCol="0">
+            <a:spAutoFit/>
+          </a:bodyPr>
+          <a:lstStyle/>
+          <a:p>
+            <a:endParaRPr lang="en-US" dirty="0"/>
+          </a:p>
+        </p:txBody>
+      </p:sp>
+    </p:spTree>
+    <p:extLst>
+      <p:ext uri="{BB962C8B-B14F-4D97-AF65-F5344CB8AC3E}">
+        <p14:creationId xmlns:p14="http://schemas.microsoft.com/office/powerpoint/2010/main" val="2253251484"/>
+      </p:ext>
+    </p:extLst>
+  </p:cSld>
+  <p:clrMapOvr>
+    <a:masterClrMapping/>
+  </p:clrMapOvr>
+  <p:timing>
+    <p:tnLst>
+      <p:par>
+        <p:cTn xmlns:p14="http://schemas.microsoft.com/office/powerpoint/2010/main" id="1" dur="indefinite" restart="never" nodeType="tmRoot">
+          <p:childTnLst>
+            <p:seq concurrent="1" nextAc="seek">
+              <p:cTn id="2" dur="indefinite" nodeType="mainSeq">
+                <p:childTnLst>
+                  <p:par>
+                    <p:cTn id="3" fill="hold">
+                      <p:stCondLst>
+                        <p:cond delay="indefinite"/>
+                      </p:stCondLst>
+                      <p:childTnLst>
+                        <p:par>
+                          <p:cTn id="4" fill="hold">
+                            <p:stCondLst>
+                              <p:cond delay="0"/>
+                            </p:stCondLst>
+                            <p:childTnLst>
+                              <p:par>
+                                <p:cTn id="5" presetID="20" presetClass="entr" presetSubtype="0" fill="hold" grpId="0" nodeType="clickEffect">
+                                  <p:stCondLst>
+                                    <p:cond delay="0"/>
+                                  </p:stCondLst>
+                                  <p:childTnLst>
+                                    <p:set>
+                                      <p:cBhvr>
+                                        <p:cTn id="6" dur="1" fill="hold">
+                                          <p:stCondLst>
+                                            <p:cond delay="0"/>
+                                          </p:stCondLst>
+                                        </p:cTn>
+                                        <p:tgtEl>
+                                          <p:spTgt spid="2"/>
+                                        </p:tgtEl>
+                                        <p:attrNameLst>
+                                          <p:attrName>style.visibility</p:attrName>
+                                        </p:attrNameLst>
+                                      </p:cBhvr>
+                                      <p:to>
+                                        <p:strVal val="visible"/>
+                                      </p:to>
+                                    </p:set>
+                                    <p:animEffect transition="in" filter="wedge">
+                                      <p:cBhvr>
+                                        <p:cTn id="7" dur="1000"/>
+                                        <p:tgtEl>
+                                          <p:spTgt spid="2"/>
+                                        </p:tgtEl>
+                                      </p:cBhvr>
+                                    </p:animEffect>
+                                  </p:childTnLst>
+                                </p:cTn>
+                              </p:par>
+                            </p:childTnLst>
+                          </p:cTn>
+                        </p:par>
+                      </p:childTnLst>
+                    </p:cTn>
+                  </p:par>
+                  <p:par>
+                    <p:cTn id="8" fill="hold">
+                      <p:stCondLst>
+                        <p:cond delay="indefinite"/>
+                      </p:stCondLst>
+                      <p:childTnLst>
+                        <p:par>
+                          <p:cTn id="9" fill="hold">
+                            <p:stCondLst>
+                              <p:cond delay="0"/>
+                            </p:stCondLst>
+                            <p:childTnLst>
+                              <p:par>
+                                <p:cTn id="10" presetID="1" presetClass="exit" presetSubtype="0" fill="hold" nodeType="clickEffect">
+                                  <p:stCondLst>
+                                    <p:cond delay="0"/>
+                                  </p:stCondLst>
+                                  <p:childTnLst>
+                                    <p:set>
+                                      <p:cBhvr>
+                                        <p:cTn id="11" dur="1" fill="hold">
+                                          <p:stCondLst>
+                                            <p:cond delay="0"/>
+                                          </p:stCondLst>
+                                        </p:cTn>
+                                        <p:tgtEl>
+                                          <p:spTgt spid="9"/>
+                                        </p:tgtEl>
+                                        <p:attrNameLst>
+                                          <p:attrName>style.visibility</p:attrName>
+                                        </p:attrNameLst>
+                                      </p:cBhvr>
+                                      <p:to>
+                                        <p:strVal val="hidden"/>
+                                      </p:to>
+                                    </p:set>
+                                  </p:childTnLst>
+                                </p:cTn>
+                              </p:par>
+                              <p:par>
+                                <p:cTn id="12" presetID="1" presetClass="entr" presetSubtype="0" fill="hold" nodeType="withEffect">
+                                  <p:stCondLst>
+                                    <p:cond delay="0"/>
+                                  </p:stCondLst>
+                                  <p:childTnLst>
+                                    <p:set>
+                                      <p:cBhvr>
+                                        <p:cTn id="13" dur="1" fill="hold">
+                                          <p:stCondLst>
+                                            <p:cond delay="0"/>
+                                          </p:stCondLst>
+                                        </p:cTn>
+                                        <p:tgtEl>
+                                          <p:spTgt spid="5"/>
+                                        </p:tgtEl>
+                                        <p:attrNameLst>
+                                          <p:attrName>style.visibility</p:attrName>
+                                        </p:attrNameLst>
+                                      </p:cBhvr>
+                                      <p:to>
+                                        <p:strVal val="visible"/>
+                                      </p:to>
+                                    </p:set>
+                                  </p:childTnLst>
+                                </p:cTn>
+                              </p:par>
+                            </p:childTnLst>
+                          </p:cTn>
+                        </p:par>
+                      </p:childTnLst>
+                    </p:cTn>
+                  </p:par>
+                  <p:par>
+                    <p:cTn id="14" fill="hold">
+                      <p:stCondLst>
+                        <p:cond delay="indefinite"/>
+                      </p:stCondLst>
+                      <p:childTnLst>
+                        <p:par>
+                          <p:cTn id="15" fill="hold">
+                            <p:stCondLst>
+                              <p:cond delay="0"/>
+                            </p:stCondLst>
+                            <p:childTnLst>
+                              <p:par>
+                                <p:cTn id="16" presetID="20" presetClass="entr" presetSubtype="0" fill="hold" grpId="0" nodeType="clickEffect">
+                                  <p:stCondLst>
+                                    <p:cond delay="0"/>
+                                  </p:stCondLst>
+                                  <p:childTnLst>
+                                    <p:set>
+                                      <p:cBhvr>
+                                        <p:cTn id="17" dur="1" fill="hold">
+                                          <p:stCondLst>
+                                            <p:cond delay="0"/>
+                                          </p:stCondLst>
+                                        </p:cTn>
+                                        <p:tgtEl>
+                                          <p:spTgt spid="3"/>
+                                        </p:tgtEl>
+                                        <p:attrNameLst>
+                                          <p:attrName>style.visibility</p:attrName>
+                                        </p:attrNameLst>
+                                      </p:cBhvr>
+                                      <p:to>
+                                        <p:strVal val="visible"/>
+                                      </p:to>
+                                    </p:set>
+                                    <p:animEffect transition="in" filter="wedge">
+                                      <p:cBhvr>
+                                        <p:cTn id="18" dur="1000"/>
+                                        <p:tgtEl>
+                                          <p:spTgt spid="3"/>
+                                        </p:tgtEl>
+                                      </p:cBhvr>
+                                    </p:animEffect>
+                                  </p:childTnLst>
+                                </p:cTn>
+                              </p:par>
+                            </p:childTnLst>
+                          </p:cTn>
+                        </p:par>
+                      </p:childTnLst>
+                    </p:cTn>
+                  </p:par>
+                </p:childTnLst>
+              </p:cTn>
+              <p:prevCondLst>
+                <p:cond evt="onPrev" delay="0">
+                  <p:tgtEl>
+                    <p:sldTgt/>
+                  </p:tgtEl>
+                </p:cond>
+              </p:prevCondLst>
+              <p:nextCondLst>
+                <p:cond evt="onNext" delay="0">
+                  <p:tgtEl>
+                    <p:sldTgt/>
+                  </p:tgtEl>
+                </p:cond>
+              </p:nextCondLst>
+            </p:seq>
+          </p:childTnLst>
+        </p:cTn>
+      </p:par>
+    </p:tnLst>
+    <p:bldLst>
+      <p:bldP spid="2" grpId="0" animBg="1"/>
+      <p:bldP spid="3" grpId="0" animBg="1"/>
+    </p:bldLst>
+  </p:timing>
+</p:sld>
+</file>
+
+<file path=ppt/slides/slide13.xml><?xml version="1.0" encoding="utf-8"?>
+<p:sld xmlns:a="http://schemas.openxmlformats.org/drawingml/2006/main" xmlns:r="http://schemas.openxmlformats.org/officeDocument/2006/relationships" xmlns:p="http://schemas.openxmlformats.org/presentationml/2006/main">
+  <p:cSld>
+    <p:spTree>
+      <p:nvGrpSpPr>
+        <p:cNvPr id="1" name=""/>
+        <p:cNvGrpSpPr/>
+        <p:nvPr/>
+      </p:nvGrpSpPr>
+      <p:grpSpPr>
+        <a:xfrm>
+          <a:off x="0" y="0"/>
+          <a:ext cx="0" cy="0"/>
+          <a:chOff x="0" y="0"/>
+          <a:chExt cx="0" cy="0"/>
+        </a:xfrm>
+      </p:grpSpPr>
+      <p:pic>
+        <p:nvPicPr>
           <p:cNvPr id="3" name="Picture 2"/>
           <p:cNvPicPr>
             <a:picLocks noChangeAspect="1"/>
@@ -11543,7 +12227,7 @@
 </p:sld>
 </file>
 
-<file path=ppt/slides/slide13.xml><?xml version="1.0" encoding="utf-8"?>
+<file path=ppt/slides/slide14.xml><?xml version="1.0" encoding="utf-8"?>
 <p:sld xmlns:a="http://schemas.openxmlformats.org/drawingml/2006/main" xmlns:r="http://schemas.openxmlformats.org/officeDocument/2006/relationships" xmlns:p="http://schemas.openxmlformats.org/presentationml/2006/main">
   <p:cSld>
     <p:spTree>
@@ -11917,7 +12601,99 @@
 </p:sld>
 </file>
 
-<file path=ppt/slides/slide14.xml><?xml version="1.0" encoding="utf-8"?>
+<file path=ppt/slides/slide15.xml><?xml version="1.0" encoding="utf-8"?>
+<p:sld xmlns:a="http://schemas.openxmlformats.org/drawingml/2006/main" xmlns:r="http://schemas.openxmlformats.org/officeDocument/2006/relationships" xmlns:p="http://schemas.openxmlformats.org/presentationml/2006/main">
+  <p:cSld>
+    <p:spTree>
+      <p:nvGrpSpPr>
+        <p:cNvPr id="1" name=""/>
+        <p:cNvGrpSpPr/>
+        <p:nvPr/>
+      </p:nvGrpSpPr>
+      <p:grpSpPr>
+        <a:xfrm>
+          <a:off x="0" y="0"/>
+          <a:ext cx="0" cy="0"/>
+          <a:chOff x="0" y="0"/>
+          <a:chExt cx="0" cy="0"/>
+        </a:xfrm>
+      </p:grpSpPr>
+      <p:sp>
+        <p:nvSpPr>
+          <p:cNvPr id="2" name="Q&amp;A"/>
+          <p:cNvSpPr/>
+          <p:nvPr/>
+        </p:nvSpPr>
+        <p:spPr>
+          <a:xfrm>
+            <a:off x="3180433" y="299415"/>
+            <a:ext cx="2783134" cy="1569660"/>
+          </a:xfrm>
+          <a:prstGeom prst="rect">
+            <a:avLst/>
+          </a:prstGeom>
+          <a:noFill/>
+        </p:spPr>
+        <p:txBody>
+          <a:bodyPr wrap="none" lIns="91440" tIns="45720" rIns="91440" bIns="45720">
+            <a:spAutoFit/>
+          </a:bodyPr>
+          <a:lstStyle/>
+          <a:p>
+            <a:pPr algn="ctr"/>
+            <a:r>
+              <a:rPr lang="en-US" sz="9600" b="0" cap="none" spc="0" dirty="0" smtClean="0">
+                <a:ln w="0"/>
+                <a:solidFill>
+                  <a:schemeClr val="accent1"/>
+                </a:solidFill>
+                <a:effectLst>
+                  <a:outerShdw blurRad="38100" dist="25400" dir="5400000" algn="ctr" rotWithShape="0">
+                    <a:srgbClr val="6E747A">
+                      <a:alpha val="43000"/>
+                    </a:srgbClr>
+                  </a:outerShdw>
+                </a:effectLst>
+              </a:rPr>
+              <a:t>Q&amp;A</a:t>
+            </a:r>
+            <a:endParaRPr lang="en-US" sz="9600" b="0" cap="none" spc="0" dirty="0">
+              <a:ln w="0"/>
+              <a:solidFill>
+                <a:schemeClr val="accent1"/>
+              </a:solidFill>
+              <a:effectLst>
+                <a:outerShdw blurRad="38100" dist="25400" dir="5400000" algn="ctr" rotWithShape="0">
+                  <a:srgbClr val="6E747A">
+                    <a:alpha val="43000"/>
+                  </a:srgbClr>
+                </a:outerShdw>
+              </a:effectLst>
+            </a:endParaRPr>
+          </a:p>
+        </p:txBody>
+      </p:sp>
+    </p:spTree>
+    <p:extLst>
+      <p:ext uri="{BB962C8B-B14F-4D97-AF65-F5344CB8AC3E}">
+        <p14:creationId xmlns:p14="http://schemas.microsoft.com/office/powerpoint/2010/main" val="860214399"/>
+      </p:ext>
+    </p:extLst>
+  </p:cSld>
+  <p:clrMapOvr>
+    <a:masterClrMapping/>
+  </p:clrMapOvr>
+  <p:timing>
+    <p:tnLst>
+      <p:par>
+        <p:cTn xmlns:p14="http://schemas.microsoft.com/office/powerpoint/2010/main" id="1" dur="indefinite" restart="never" nodeType="tmRoot"/>
+      </p:par>
+    </p:tnLst>
+  </p:timing>
+</p:sld>
+</file>
+
+<file path=ppt/slides/slide16.xml><?xml version="1.0" encoding="utf-8"?>
 <p:sld xmlns:a="http://schemas.openxmlformats.org/drawingml/2006/main" xmlns:r="http://schemas.openxmlformats.org/officeDocument/2006/relationships" xmlns:p="http://schemas.openxmlformats.org/presentationml/2006/main">
   <p:cSld>
     <p:spTree>
@@ -12054,29 +12830,7 @@
                   </a:outerShdw>
                 </a:effectLst>
               </a:rPr>
-              <a:t>, </a:t>
-            </a:r>
-            <a:r>
-              <a:rPr lang="en-US" sz="5400" b="1" cap="none" spc="0" smtClean="0">
-                <a:ln w="9525">
-                  <a:solidFill>
-                    <a:schemeClr val="bg1"/>
-                  </a:solidFill>
-                  <a:prstDash val="solid"/>
-                </a:ln>
-                <a:solidFill>
-                  <a:schemeClr val="accent5"/>
-                </a:solidFill>
-                <a:effectLst>
-                  <a:outerShdw blurRad="12700" dist="38100" dir="2700000" algn="tl" rotWithShape="0">
-                    <a:schemeClr val="accent5">
-                      <a:lumMod val="60000"/>
-                      <a:lumOff val="40000"/>
-                    </a:schemeClr>
-                  </a:outerShdw>
-                </a:effectLst>
-              </a:rPr>
-              <a:t>42</a:t>
+              <a:t>, 42</a:t>
             </a:r>
             <a:endParaRPr lang="en-US" sz="5400" b="1" cap="none" spc="0" dirty="0">
               <a:ln w="9525">
@@ -12133,7 +12887,7 @@
     </p:spTree>
     <p:extLst>
       <p:ext uri="{BB962C8B-B14F-4D97-AF65-F5344CB8AC3E}">
-        <p14:creationId xmlns:p14="http://schemas.microsoft.com/office/powerpoint/2010/main" val="860214399"/>
+        <p14:creationId xmlns:p14="http://schemas.microsoft.com/office/powerpoint/2010/main" val="1763858363"/>
       </p:ext>
     </p:extLst>
   </p:cSld>
@@ -12356,7 +13110,7 @@
 </p:sld>
 </file>
 
-<file path=ppt/slides/slide2.xml><?xml version="1.0" encoding="utf-8"?>
+<file path=ppt/slides/slide17.xml><?xml version="1.0" encoding="utf-8"?>
 <p:sld xmlns:a="http://schemas.openxmlformats.org/drawingml/2006/main" xmlns:r="http://schemas.openxmlformats.org/officeDocument/2006/relationships" xmlns:p="http://schemas.openxmlformats.org/presentationml/2006/main">
   <p:cSld>
     <p:spTree>
@@ -12423,7 +13177,7 @@
 </p:sld>
 </file>
 
-<file path=ppt/slides/slide3.xml><?xml version="1.0" encoding="utf-8"?>
+<file path=ppt/slides/slide2.xml><?xml version="1.0" encoding="utf-8"?>
 <p:sld xmlns:a="http://schemas.openxmlformats.org/drawingml/2006/main" xmlns:r="http://schemas.openxmlformats.org/officeDocument/2006/relationships" xmlns:p="http://schemas.openxmlformats.org/presentationml/2006/main">
   <p:cSld>
     <p:spTree>
@@ -12490,7 +13244,7 @@
 </p:sld>
 </file>
 
-<file path=ppt/slides/slide4.xml><?xml version="1.0" encoding="utf-8"?>
+<file path=ppt/slides/slide3.xml><?xml version="1.0" encoding="utf-8"?>
 <p:sld xmlns:a="http://schemas.openxmlformats.org/drawingml/2006/main" xmlns:r="http://schemas.openxmlformats.org/officeDocument/2006/relationships" xmlns:p="http://schemas.openxmlformats.org/presentationml/2006/main">
   <p:cSld>
     <p:spTree>
@@ -13372,7 +14126,7 @@
 </p:sld>
 </file>
 
-<file path=ppt/slides/slide5.xml><?xml version="1.0" encoding="utf-8"?>
+<file path=ppt/slides/slide4.xml><?xml version="1.0" encoding="utf-8"?>
 <p:sld xmlns:a="http://schemas.openxmlformats.org/drawingml/2006/main" xmlns:r="http://schemas.openxmlformats.org/officeDocument/2006/relationships" xmlns:p="http://schemas.openxmlformats.org/presentationml/2006/main">
   <p:cSld>
     <p:spTree>
@@ -13391,7 +14145,7 @@
       </p:grpSpPr>
       <p:pic>
         <p:nvPicPr>
-          <p:cNvPr id="2" name="Basic Bill"/>
+          <p:cNvPr id="3" name="Success Bill"/>
           <p:cNvPicPr>
             <a:picLocks noChangeAspect="1"/>
           </p:cNvPicPr>
@@ -13421,7 +14175,7 @@
       </p:pic>
       <p:pic>
         <p:nvPicPr>
-          <p:cNvPr id="3" name="Success Bill"/>
+          <p:cNvPr id="5" name="Defeat Bill"/>
           <p:cNvPicPr>
             <a:picLocks noChangeAspect="1"/>
           </p:cNvPicPr>
@@ -13451,7 +14205,7 @@
       </p:pic>
       <p:pic>
         <p:nvPicPr>
-          <p:cNvPr id="4" name="Nice Cake"/>
+          <p:cNvPr id="2" name="Basic Bill"/>
           <p:cNvPicPr>
             <a:picLocks noChangeAspect="1"/>
           </p:cNvPicPr>
@@ -13471,8 +14225,8 @@
         </p:blipFill>
         <p:spPr>
           <a:xfrm>
-            <a:off x="2851003" y="949694"/>
-            <a:ext cx="4730012" cy="3748150"/>
+            <a:off x="-184830" y="2539686"/>
+            <a:ext cx="3962400" cy="2971800"/>
           </a:xfrm>
           <a:prstGeom prst="rect">
             <a:avLst/>
@@ -13481,7 +14235,7 @@
       </p:pic>
       <p:pic>
         <p:nvPicPr>
-          <p:cNvPr id="5" name="Defeat Bill"/>
+          <p:cNvPr id="4" name="Nice Cake"/>
           <p:cNvPicPr>
             <a:picLocks noChangeAspect="1"/>
           </p:cNvPicPr>
@@ -13501,8 +14255,8 @@
         </p:blipFill>
         <p:spPr>
           <a:xfrm>
-            <a:off x="-184830" y="2539686"/>
-            <a:ext cx="3962400" cy="2971800"/>
+            <a:off x="2851003" y="949694"/>
+            <a:ext cx="4730012" cy="3748150"/>
           </a:xfrm>
           <a:prstGeom prst="rect">
             <a:avLst/>
@@ -14065,7 +14819,7 @@
 </p:sld>
 </file>
 
-<file path=ppt/slides/slide6.xml><?xml version="1.0" encoding="utf-8"?>
+<file path=ppt/slides/slide5.xml><?xml version="1.0" encoding="utf-8"?>
 <p:sld xmlns:a="http://schemas.openxmlformats.org/drawingml/2006/main" xmlns:r="http://schemas.openxmlformats.org/officeDocument/2006/relationships" xmlns:p="http://schemas.openxmlformats.org/presentationml/2006/main">
   <p:cSld>
     <p:spTree>
@@ -15189,7 +15943,7 @@
 </p:sld>
 </file>
 
-<file path=ppt/slides/slide7.xml><?xml version="1.0" encoding="utf-8"?>
+<file path=ppt/slides/slide6.xml><?xml version="1.0" encoding="utf-8"?>
 <p:sld xmlns:a="http://schemas.openxmlformats.org/drawingml/2006/main" xmlns:r="http://schemas.openxmlformats.org/officeDocument/2006/relationships" xmlns:p="http://schemas.openxmlformats.org/presentationml/2006/main">
   <p:cSld>
     <p:spTree>
@@ -15208,7 +15962,7 @@
       </p:grpSpPr>
       <p:pic>
         <p:nvPicPr>
-          <p:cNvPr id="4" name="Thinking Bill"/>
+          <p:cNvPr id="5" name="Defeat Bill"/>
           <p:cNvPicPr>
             <a:picLocks noChangeAspect="1"/>
           </p:cNvPicPr>
@@ -15238,7 +15992,7 @@
       </p:pic>
       <p:pic>
         <p:nvPicPr>
-          <p:cNvPr id="5" name="Defeat Bill"/>
+          <p:cNvPr id="4" name="Thinking Bill"/>
           <p:cNvPicPr>
             <a:picLocks noChangeAspect="1"/>
           </p:cNvPicPr>
@@ -15575,7 +16329,7 @@
 </p:sld>
 </file>
 
-<file path=ppt/slides/slide8.xml><?xml version="1.0" encoding="utf-8"?>
+<file path=ppt/slides/slide7.xml><?xml version="1.0" encoding="utf-8"?>
 <p:sld xmlns:a="http://schemas.openxmlformats.org/drawingml/2006/main" xmlns:r="http://schemas.openxmlformats.org/officeDocument/2006/relationships" xmlns:p="http://schemas.openxmlformats.org/presentationml/2006/main">
   <p:cSld>
     <p:spTree>
@@ -15672,7 +16426,7 @@
 </p:sld>
 </file>
 
-<file path=ppt/slides/slide9.xml><?xml version="1.0" encoding="utf-8"?>
+<file path=ppt/slides/slide8.xml><?xml version="1.0" encoding="utf-8"?>
 <p:sld xmlns:a="http://schemas.openxmlformats.org/drawingml/2006/main" xmlns:r="http://schemas.openxmlformats.org/officeDocument/2006/relationships" xmlns:p="http://schemas.openxmlformats.org/presentationml/2006/main">
   <p:cSld>
     <p:spTree>
@@ -19665,6 +20419,103 @@
       <p:bldP spid="36" grpId="0" animBg="1"/>
       <p:bldP spid="37" grpId="0" animBg="1"/>
     </p:bldLst>
+  </p:timing>
+</p:sld>
+</file>
+
+<file path=ppt/slides/slide9.xml><?xml version="1.0" encoding="utf-8"?>
+<p:sld xmlns:a="http://schemas.openxmlformats.org/drawingml/2006/main" xmlns:r="http://schemas.openxmlformats.org/officeDocument/2006/relationships" xmlns:p="http://schemas.openxmlformats.org/presentationml/2006/main">
+  <p:cSld>
+    <p:spTree>
+      <p:nvGrpSpPr>
+        <p:cNvPr id="1" name=""/>
+        <p:cNvGrpSpPr/>
+        <p:nvPr/>
+      </p:nvGrpSpPr>
+      <p:grpSpPr>
+        <a:xfrm>
+          <a:off x="0" y="0"/>
+          <a:ext cx="0" cy="0"/>
+          <a:chOff x="0" y="0"/>
+          <a:chExt cx="0" cy="0"/>
+        </a:xfrm>
+      </p:grpSpPr>
+      <p:pic>
+        <p:nvPicPr>
+          <p:cNvPr id="4" name="Thinking Bill"/>
+          <p:cNvPicPr>
+            <a:picLocks noChangeAspect="1"/>
+          </p:cNvPicPr>
+          <p:nvPr/>
+        </p:nvPicPr>
+        <p:blipFill>
+          <a:blip r:embed="rId3" cstate="email">
+            <a:extLst>
+              <a:ext uri="{28A0092B-C50C-407E-A947-70E740481C1C}">
+                <a14:useLocalDpi xmlns:a14="http://schemas.microsoft.com/office/drawing/2010/main" val="0"/>
+              </a:ext>
+            </a:extLst>
+          </a:blip>
+          <a:stretch>
+            <a:fillRect/>
+          </a:stretch>
+        </p:blipFill>
+        <p:spPr>
+          <a:xfrm>
+            <a:off x="-184830" y="2539686"/>
+            <a:ext cx="3962400" cy="2971800"/>
+          </a:xfrm>
+          <a:prstGeom prst="rect">
+            <a:avLst/>
+          </a:prstGeom>
+        </p:spPr>
+      </p:pic>
+      <p:pic>
+        <p:nvPicPr>
+          <p:cNvPr id="2" name="Layered Cake"/>
+          <p:cNvPicPr>
+            <a:picLocks noChangeAspect="1"/>
+          </p:cNvPicPr>
+          <p:nvPr/>
+        </p:nvPicPr>
+        <p:blipFill>
+          <a:blip r:embed="rId4" cstate="email">
+            <a:extLst>
+              <a:ext uri="{28A0092B-C50C-407E-A947-70E740481C1C}">
+                <a14:useLocalDpi xmlns:a14="http://schemas.microsoft.com/office/drawing/2010/main" val="0"/>
+              </a:ext>
+            </a:extLst>
+          </a:blip>
+          <a:stretch>
+            <a:fillRect/>
+          </a:stretch>
+        </p:blipFill>
+        <p:spPr>
+          <a:xfrm>
+            <a:off x="3104920" y="300901"/>
+            <a:ext cx="5121902" cy="3845797"/>
+          </a:xfrm>
+          <a:prstGeom prst="rect">
+            <a:avLst/>
+          </a:prstGeom>
+        </p:spPr>
+      </p:pic>
+    </p:spTree>
+    <p:extLst>
+      <p:ext uri="{BB962C8B-B14F-4D97-AF65-F5344CB8AC3E}">
+        <p14:creationId xmlns:p14="http://schemas.microsoft.com/office/powerpoint/2010/main" val="991646283"/>
+      </p:ext>
+    </p:extLst>
+  </p:cSld>
+  <p:clrMapOvr>
+    <a:masterClrMapping/>
+  </p:clrMapOvr>
+  <p:timing>
+    <p:tnLst>
+      <p:par>
+        <p:cTn xmlns:p14="http://schemas.microsoft.com/office/powerpoint/2010/main" id="1" dur="indefinite" restart="never" nodeType="tmRoot"/>
+      </p:par>
+    </p:tnLst>
   </p:timing>
 </p:sld>
 </file>

</xml_diff>

<commit_message>
Added cake slice photo
Added the above photo to better indicate the problem to divide with layers
</commit_message>
<xml_diff>
--- a/FeaturesVsLayers.pptx
+++ b/FeaturesVsLayers.pptx
@@ -125,7 +125,7 @@
   </p:defaultTextStyle>
   <p:extLst>
     <p:ext uri="{EFAFB233-063F-42B5-8137-9DF3F51BA10A}">
-      <p15:sldGuideLst xmlns="" xmlns:p15="http://schemas.microsoft.com/office/powerpoint/2012/main">
+      <p15:sldGuideLst xmlns:p15="http://schemas.microsoft.com/office/powerpoint/2012/main" xmlns="">
         <p15:guide id="1" orient="horz" pos="2160">
           <p15:clr>
             <a:srgbClr val="A4A3A4"/>
@@ -224,7 +224,7 @@
           <a:p>
             <a:fld id="{42140A06-DE53-954F-B7AB-07F13EFF4F14}" type="datetimeFigureOut">
               <a:rPr lang="en-US" smtClean="0"/>
-              <a:t>14/03/16</a:t>
+              <a:t>15/03/16</a:t>
             </a:fld>
             <a:endParaRPr lang="en-US"/>
           </a:p>
@@ -552,11 +552,7 @@
           <a:p>
             <a:r>
               <a:rPr lang="en-US" dirty="0" smtClean="0"/>
-              <a:t>Intro</a:t>
-            </a:r>
-            <a:r>
-              <a:rPr lang="en-US" dirty="0" smtClean="0"/>
-              <a:t>:</a:t>
+              <a:t>Intro:</a:t>
             </a:r>
           </a:p>
           <a:p>
@@ -2810,7 +2806,7 @@
           <a:p>
             <a:fld id="{B01F9CA3-105E-4857-9057-6DB6197DA786}" type="datetimeFigureOut">
               <a:rPr lang="en-US" smtClean="0"/>
-              <a:t>14/03/16</a:t>
+              <a:t>15/03/16</a:t>
             </a:fld>
             <a:endParaRPr lang="en-US"/>
           </a:p>
@@ -3002,7 +2998,7 @@
           <a:p>
             <a:fld id="{B01F9CA3-105E-4857-9057-6DB6197DA786}" type="datetimeFigureOut">
               <a:rPr lang="en-US" smtClean="0"/>
-              <a:t>14/03/16</a:t>
+              <a:t>15/03/16</a:t>
             </a:fld>
             <a:endParaRPr lang="en-US"/>
           </a:p>
@@ -3271,7 +3267,7 @@
           <a:p>
             <a:fld id="{B01F9CA3-105E-4857-9057-6DB6197DA786}" type="datetimeFigureOut">
               <a:rPr lang="en-US" smtClean="0"/>
-              <a:t>14/03/16</a:t>
+              <a:t>15/03/16</a:t>
             </a:fld>
             <a:endParaRPr lang="en-US"/>
           </a:p>
@@ -3450,7 +3446,7 @@
           <a:p>
             <a:fld id="{B01F9CA3-105E-4857-9057-6DB6197DA786}" type="datetimeFigureOut">
               <a:rPr lang="en-US" smtClean="0"/>
-              <a:t>14/03/16</a:t>
+              <a:t>15/03/16</a:t>
             </a:fld>
             <a:endParaRPr lang="en-US"/>
           </a:p>
@@ -3619,7 +3615,7 @@
           <a:p>
             <a:fld id="{B01F9CA3-105E-4857-9057-6DB6197DA786}" type="datetimeFigureOut">
               <a:rPr lang="en-US" smtClean="0"/>
-              <a:t>14/03/16</a:t>
+              <a:t>15/03/16</a:t>
             </a:fld>
             <a:endParaRPr lang="en-US"/>
           </a:p>
@@ -3861,7 +3857,7 @@
           <a:p>
             <a:fld id="{B01F9CA3-105E-4857-9057-6DB6197DA786}" type="datetimeFigureOut">
               <a:rPr lang="en-US" smtClean="0"/>
-              <a:t>14/03/16</a:t>
+              <a:t>15/03/16</a:t>
             </a:fld>
             <a:endParaRPr lang="en-US"/>
           </a:p>
@@ -4184,7 +4180,7 @@
           <a:p>
             <a:fld id="{B01F9CA3-105E-4857-9057-6DB6197DA786}" type="datetimeFigureOut">
               <a:rPr lang="en-US" smtClean="0"/>
-              <a:t>14/03/16</a:t>
+              <a:t>15/03/16</a:t>
             </a:fld>
             <a:endParaRPr lang="en-US"/>
           </a:p>
@@ -4482,7 +4478,7 @@
           <a:p>
             <a:fld id="{B01F9CA3-105E-4857-9057-6DB6197DA786}" type="datetimeFigureOut">
               <a:rPr lang="en-US" smtClean="0"/>
-              <a:t>14/03/16</a:t>
+              <a:t>15/03/16</a:t>
             </a:fld>
             <a:endParaRPr lang="en-US"/>
           </a:p>
@@ -4938,7 +4934,7 @@
           <a:p>
             <a:fld id="{B01F9CA3-105E-4857-9057-6DB6197DA786}" type="datetimeFigureOut">
               <a:rPr lang="en-US" smtClean="0"/>
-              <a:t>14/03/16</a:t>
+              <a:t>15/03/16</a:t>
             </a:fld>
             <a:endParaRPr lang="en-US"/>
           </a:p>
@@ -5051,7 +5047,7 @@
           <a:p>
             <a:fld id="{B01F9CA3-105E-4857-9057-6DB6197DA786}" type="datetimeFigureOut">
               <a:rPr lang="en-US" smtClean="0"/>
-              <a:t>14/03/16</a:t>
+              <a:t>15/03/16</a:t>
             </a:fld>
             <a:endParaRPr lang="en-US"/>
           </a:p>
@@ -5141,7 +5137,7 @@
           <a:p>
             <a:fld id="{B01F9CA3-105E-4857-9057-6DB6197DA786}" type="datetimeFigureOut">
               <a:rPr lang="en-US" smtClean="0"/>
-              <a:t>14/03/16</a:t>
+              <a:t>15/03/16</a:t>
             </a:fld>
             <a:endParaRPr lang="en-US"/>
           </a:p>
@@ -5423,7 +5419,7 @@
           <a:p>
             <a:fld id="{B01F9CA3-105E-4857-9057-6DB6197DA786}" type="datetimeFigureOut">
               <a:rPr lang="en-US" smtClean="0"/>
-              <a:t>14/03/16</a:t>
+              <a:t>15/03/16</a:t>
             </a:fld>
             <a:endParaRPr lang="en-US"/>
           </a:p>
@@ -5629,7 +5625,7 @@
           <a:p>
             <a:fld id="{B01F9CA3-105E-4857-9057-6DB6197DA786}" type="datetimeFigureOut">
               <a:rPr lang="en-US" smtClean="0"/>
-              <a:t>14/03/16</a:t>
+              <a:t>15/03/16</a:t>
             </a:fld>
             <a:endParaRPr lang="en-US"/>
           </a:p>
@@ -20500,6 +20496,36 @@
           </a:prstGeom>
         </p:spPr>
       </p:pic>
+      <p:pic>
+        <p:nvPicPr>
+          <p:cNvPr id="3" name="Picture 2" descr="cake-slice.jpg"/>
+          <p:cNvPicPr>
+            <a:picLocks noChangeAspect="1"/>
+          </p:cNvPicPr>
+          <p:nvPr/>
+        </p:nvPicPr>
+        <p:blipFill>
+          <a:blip r:embed="rId5">
+            <a:extLst>
+              <a:ext uri="{28A0092B-C50C-407E-A947-70E740481C1C}">
+                <a14:useLocalDpi xmlns:a14="http://schemas.microsoft.com/office/drawing/2010/main" val="0"/>
+              </a:ext>
+            </a:extLst>
+          </a:blip>
+          <a:stretch>
+            <a:fillRect/>
+          </a:stretch>
+        </p:blipFill>
+        <p:spPr>
+          <a:xfrm>
+            <a:off x="988595" y="-10117"/>
+            <a:ext cx="1912352" cy="2549803"/>
+          </a:xfrm>
+          <a:prstGeom prst="rect">
+            <a:avLst/>
+          </a:prstGeom>
+        </p:spPr>
+      </p:pic>
     </p:spTree>
     <p:extLst>
       <p:ext uri="{BB962C8B-B14F-4D97-AF65-F5344CB8AC3E}">

</xml_diff>

<commit_message>
Small modifications of things to say
</commit_message>
<xml_diff>
--- a/FeaturesVsLayers.pptx
+++ b/FeaturesVsLayers.pptx
@@ -128,7 +128,7 @@
   </p:defaultTextStyle>
   <p:extLst>
     <p:ext uri="{EFAFB233-063F-42B5-8137-9DF3F51BA10A}">
-      <p15:sldGuideLst xmlns="" xmlns:p15="http://schemas.microsoft.com/office/powerpoint/2012/main">
+      <p15:sldGuideLst xmlns:p15="http://schemas.microsoft.com/office/powerpoint/2012/main" xmlns="">
         <p15:guide id="1" orient="horz" pos="2160">
           <p15:clr>
             <a:srgbClr val="A4A3A4"/>
@@ -227,7 +227,7 @@
           <a:p>
             <a:fld id="{42140A06-DE53-954F-B7AB-07F13EFF4F14}" type="datetimeFigureOut">
               <a:rPr lang="en-US" smtClean="0"/>
-              <a:t>10/04/16</a:t>
+              <a:t>18/04/16</a:t>
             </a:fld>
             <a:endParaRPr lang="en-US"/>
           </a:p>
@@ -565,19 +565,31 @@
             </a:r>
             <a:r>
               <a:rPr lang="en-US" baseline="0" dirty="0" smtClean="0"/>
-              <a:t> and </a:t>
+              <a:t> and mentoring. Not because I consider myself the knees </a:t>
             </a:r>
             <a:r>
               <a:rPr lang="en-US" baseline="0" dirty="0" smtClean="0"/>
-              <a:t>mentoring. </a:t>
+              <a:t>bees (sometimes I am no expert). </a:t>
             </a:r>
             <a:r>
               <a:rPr lang="en-US" baseline="0" dirty="0" smtClean="0"/>
-              <a:t>Not because I consider myself the knees bees. But because it helps me to understand better the topic. And because then I hear myself talking and go “did I say that stupidity?”. It helps me learn. Impostor syndrome? I look at the rubber-duck style of resolving issues</a:t>
+              <a:t>But because it helps me to understand better the topic. And because then I hear myself talking and go “did I say </a:t>
             </a:r>
             <a:r>
               <a:rPr lang="en-US" baseline="0" dirty="0" smtClean="0"/>
-              <a:t>.</a:t>
+              <a:t>that? What was I thinking?”</a:t>
+            </a:r>
+            <a:r>
+              <a:rPr lang="en-US" baseline="0" dirty="0" smtClean="0"/>
+              <a:t>. It helps me learn</a:t>
+            </a:r>
+            <a:r>
+              <a:rPr lang="en-US" baseline="0" dirty="0" smtClean="0"/>
+              <a:t>. It helps others. </a:t>
+            </a:r>
+            <a:r>
+              <a:rPr lang="en-US" baseline="0" dirty="0" smtClean="0"/>
+              <a:t>Impostor syndrome? I look at the rubber-duck style of resolving issues.</a:t>
             </a:r>
             <a:endParaRPr lang="en-US" dirty="0" smtClean="0"/>
           </a:p>
@@ -1017,45 +1029,6 @@
           <a:bodyPr/>
           <a:lstStyle/>
           <a:p>
-            <a:r>
-              <a:rPr lang="en-US" dirty="0" smtClean="0"/>
-              <a:t>But Bill</a:t>
-            </a:r>
-          </a:p>
-          <a:p>
-            <a:endParaRPr lang="en-US" dirty="0" smtClean="0"/>
-          </a:p>
-          <a:p>
-            <a:r>
-              <a:rPr lang="en-US" dirty="0" smtClean="0"/>
-              <a:t>What</a:t>
-            </a:r>
-            <a:r>
-              <a:rPr lang="en-US" baseline="0" dirty="0" smtClean="0"/>
-              <a:t> about Duplication</a:t>
-            </a:r>
-          </a:p>
-          <a:p>
-            <a:endParaRPr lang="en-US" baseline="0" dirty="0" smtClean="0"/>
-          </a:p>
-          <a:p>
-            <a:r>
-              <a:rPr lang="en-US" baseline="0" dirty="0" err="1" smtClean="0"/>
-              <a:t>DeDuplication</a:t>
-            </a:r>
-            <a:r>
-              <a:rPr lang="en-US" baseline="0" dirty="0" smtClean="0"/>
-              <a:t> only has to happen when the code is the same (or you can make it look the same) and the reason for changing is the same. Otherwise you will end introducing complexity</a:t>
-            </a:r>
-          </a:p>
-          <a:p>
-            <a:endParaRPr lang="en-US" baseline="0" dirty="0" smtClean="0"/>
-          </a:p>
-          <a:p>
-            <a:r>
-              <a:rPr lang="en-US" baseline="0" dirty="0" smtClean="0"/>
-              <a:t>Granularity. You have to decide, it depends on the language and the project. Do you want to group features because they will always go together?</a:t>
-            </a:r>
             <a:endParaRPr lang="en-US" dirty="0"/>
           </a:p>
         </p:txBody>
@@ -1077,7 +1050,7 @@
           <a:p>
             <a:fld id="{2345002C-B4C8-0744-B509-29A3CA95BDFE}" type="slidenum">
               <a:rPr lang="en-US" smtClean="0"/>
-              <a:t>15</a:t>
+              <a:t>14</a:t>
             </a:fld>
             <a:endParaRPr lang="en-US"/>
           </a:p>
@@ -1086,7 +1059,7 @@
     </p:spTree>
     <p:extLst>
       <p:ext uri="{BB962C8B-B14F-4D97-AF65-F5344CB8AC3E}">
-        <p14:creationId xmlns:p14="http://schemas.microsoft.com/office/powerpoint/2010/main" val="648743644"/>
+        <p14:creationId xmlns:p14="http://schemas.microsoft.com/office/powerpoint/2010/main" val="3409318120"/>
       </p:ext>
     </p:extLst>
   </p:cSld>
@@ -1141,12 +1114,43 @@
           <a:lstStyle/>
           <a:p>
             <a:r>
-              <a:rPr lang="en-GB" dirty="0" smtClean="0"/>
-              <a:t>Did I just advocated</a:t>
-            </a:r>
-            <a:r>
-              <a:rPr lang="en-GB" baseline="0" dirty="0" smtClean="0"/>
-              <a:t> for micro-services with my cakes?</a:t>
+              <a:rPr lang="en-US" dirty="0" smtClean="0"/>
+              <a:t>But Bill</a:t>
+            </a:r>
+          </a:p>
+          <a:p>
+            <a:endParaRPr lang="en-US" dirty="0" smtClean="0"/>
+          </a:p>
+          <a:p>
+            <a:r>
+              <a:rPr lang="en-US" dirty="0" smtClean="0"/>
+              <a:t>What</a:t>
+            </a:r>
+            <a:r>
+              <a:rPr lang="en-US" baseline="0" dirty="0" smtClean="0"/>
+              <a:t> about Duplication</a:t>
+            </a:r>
+          </a:p>
+          <a:p>
+            <a:endParaRPr lang="en-US" baseline="0" dirty="0" smtClean="0"/>
+          </a:p>
+          <a:p>
+            <a:r>
+              <a:rPr lang="en-US" baseline="0" dirty="0" err="1" smtClean="0"/>
+              <a:t>DeDuplication</a:t>
+            </a:r>
+            <a:r>
+              <a:rPr lang="en-US" baseline="0" dirty="0" smtClean="0"/>
+              <a:t> only has to happen when the code is the same (or you can make it look the same) and the reason for changing is the same. Otherwise you will end introducing complexity</a:t>
+            </a:r>
+          </a:p>
+          <a:p>
+            <a:endParaRPr lang="en-US" baseline="0" dirty="0" smtClean="0"/>
+          </a:p>
+          <a:p>
+            <a:r>
+              <a:rPr lang="en-US" baseline="0" dirty="0" smtClean="0"/>
+              <a:t>Granularity. You have to decide, it depends on the language and the project. Do you want to group features because they will always go together?</a:t>
             </a:r>
             <a:endParaRPr lang="en-US" dirty="0"/>
           </a:p>
@@ -1169,7 +1173,7 @@
           <a:p>
             <a:fld id="{2345002C-B4C8-0744-B509-29A3CA95BDFE}" type="slidenum">
               <a:rPr lang="en-US" smtClean="0"/>
-              <a:t>16</a:t>
+              <a:t>15</a:t>
             </a:fld>
             <a:endParaRPr lang="en-US"/>
           </a:p>
@@ -1178,7 +1182,7 @@
     </p:spTree>
     <p:extLst>
       <p:ext uri="{BB962C8B-B14F-4D97-AF65-F5344CB8AC3E}">
-        <p14:creationId xmlns:p14="http://schemas.microsoft.com/office/powerpoint/2010/main" val="4163809378"/>
+        <p14:creationId xmlns:p14="http://schemas.microsoft.com/office/powerpoint/2010/main" val="648743644"/>
       </p:ext>
     </p:extLst>
   </p:cSld>
@@ -1234,15 +1238,11 @@
           <a:p>
             <a:r>
               <a:rPr lang="en-US" dirty="0" smtClean="0"/>
-              <a:t>Add twitter </a:t>
-            </a:r>
-            <a:r>
-              <a:rPr lang="en-US" dirty="0" err="1" smtClean="0"/>
-              <a:t>github</a:t>
+              <a:t>Which</a:t>
             </a:r>
             <a:r>
               <a:rPr lang="en-US" baseline="0" dirty="0" smtClean="0"/>
-              <a:t> and blog</a:t>
+              <a:t> actually points to another thing.</a:t>
             </a:r>
             <a:endParaRPr lang="en-US" dirty="0"/>
           </a:p>
@@ -1265,6 +1265,102 @@
           <a:p>
             <a:fld id="{2345002C-B4C8-0744-B509-29A3CA95BDFE}" type="slidenum">
               <a:rPr lang="en-US" smtClean="0"/>
+              <a:t>16</a:t>
+            </a:fld>
+            <a:endParaRPr lang="en-US"/>
+          </a:p>
+        </p:txBody>
+      </p:sp>
+    </p:spTree>
+    <p:extLst>
+      <p:ext uri="{BB962C8B-B14F-4D97-AF65-F5344CB8AC3E}">
+        <p14:creationId xmlns:p14="http://schemas.microsoft.com/office/powerpoint/2010/main" val="4163809378"/>
+      </p:ext>
+    </p:extLst>
+  </p:cSld>
+  <p:clrMapOvr>
+    <a:masterClrMapping/>
+  </p:clrMapOvr>
+</p:notes>
+</file>
+
+<file path=ppt/notesSlides/notesSlide16.xml><?xml version="1.0" encoding="utf-8"?>
+<p:notes xmlns:a="http://schemas.openxmlformats.org/drawingml/2006/main" xmlns:r="http://schemas.openxmlformats.org/officeDocument/2006/relationships" xmlns:p="http://schemas.openxmlformats.org/presentationml/2006/main">
+  <p:cSld>
+    <p:spTree>
+      <p:nvGrpSpPr>
+        <p:cNvPr id="1" name=""/>
+        <p:cNvGrpSpPr/>
+        <p:nvPr/>
+      </p:nvGrpSpPr>
+      <p:grpSpPr>
+        <a:xfrm>
+          <a:off x="0" y="0"/>
+          <a:ext cx="0" cy="0"/>
+          <a:chOff x="0" y="0"/>
+          <a:chExt cx="0" cy="0"/>
+        </a:xfrm>
+      </p:grpSpPr>
+      <p:sp>
+        <p:nvSpPr>
+          <p:cNvPr id="2" name="Slide Image Placeholder 1"/>
+          <p:cNvSpPr>
+            <a:spLocks noGrp="1" noRot="1" noChangeAspect="1"/>
+          </p:cNvSpPr>
+          <p:nvPr>
+            <p:ph type="sldImg"/>
+          </p:nvPr>
+        </p:nvSpPr>
+        <p:spPr/>
+      </p:sp>
+      <p:sp>
+        <p:nvSpPr>
+          <p:cNvPr id="3" name="Notes Placeholder 2"/>
+          <p:cNvSpPr>
+            <a:spLocks noGrp="1"/>
+          </p:cNvSpPr>
+          <p:nvPr>
+            <p:ph type="body" idx="1"/>
+          </p:nvPr>
+        </p:nvSpPr>
+        <p:spPr/>
+        <p:txBody>
+          <a:bodyPr/>
+          <a:lstStyle/>
+          <a:p>
+            <a:r>
+              <a:rPr lang="en-US" dirty="0" smtClean="0"/>
+              <a:t>Add twitter </a:t>
+            </a:r>
+            <a:r>
+              <a:rPr lang="en-US" dirty="0" err="1" smtClean="0"/>
+              <a:t>github</a:t>
+            </a:r>
+            <a:r>
+              <a:rPr lang="en-US" baseline="0" dirty="0" smtClean="0"/>
+              <a:t> and blog</a:t>
+            </a:r>
+            <a:endParaRPr lang="en-US" dirty="0"/>
+          </a:p>
+        </p:txBody>
+      </p:sp>
+      <p:sp>
+        <p:nvSpPr>
+          <p:cNvPr id="4" name="Slide Number Placeholder 3"/>
+          <p:cNvSpPr>
+            <a:spLocks noGrp="1"/>
+          </p:cNvSpPr>
+          <p:nvPr>
+            <p:ph type="sldNum" sz="quarter" idx="10"/>
+          </p:nvPr>
+        </p:nvSpPr>
+        <p:spPr/>
+        <p:txBody>
+          <a:bodyPr/>
+          <a:lstStyle/>
+          <a:p>
+            <a:fld id="{2345002C-B4C8-0744-B509-29A3CA95BDFE}" type="slidenum">
+              <a:rPr lang="en-US" smtClean="0"/>
               <a:t>17</a:t>
             </a:fld>
             <a:endParaRPr lang="en-US"/>
@@ -1284,7 +1380,7 @@
 </p:notes>
 </file>
 
-<file path=ppt/notesSlides/notesSlide16.xml><?xml version="1.0" encoding="utf-8"?>
+<file path=ppt/notesSlides/notesSlide17.xml><?xml version="1.0" encoding="utf-8"?>
 <p:notes xmlns:a="http://schemas.openxmlformats.org/drawingml/2006/main" xmlns:r="http://schemas.openxmlformats.org/officeDocument/2006/relationships" xmlns:p="http://schemas.openxmlformats.org/presentationml/2006/main">
   <p:cSld>
     <p:spTree>
@@ -2909,7 +3005,7 @@
           <a:p>
             <a:fld id="{B01F9CA3-105E-4857-9057-6DB6197DA786}" type="datetimeFigureOut">
               <a:rPr lang="en-US" smtClean="0"/>
-              <a:t>10/04/16</a:t>
+              <a:t>18/04/16</a:t>
             </a:fld>
             <a:endParaRPr lang="en-US"/>
           </a:p>
@@ -3101,7 +3197,7 @@
           <a:p>
             <a:fld id="{B01F9CA3-105E-4857-9057-6DB6197DA786}" type="datetimeFigureOut">
               <a:rPr lang="en-US" smtClean="0"/>
-              <a:t>10/04/16</a:t>
+              <a:t>18/04/16</a:t>
             </a:fld>
             <a:endParaRPr lang="en-US"/>
           </a:p>
@@ -3370,7 +3466,7 @@
           <a:p>
             <a:fld id="{B01F9CA3-105E-4857-9057-6DB6197DA786}" type="datetimeFigureOut">
               <a:rPr lang="en-US" smtClean="0"/>
-              <a:t>10/04/16</a:t>
+              <a:t>18/04/16</a:t>
             </a:fld>
             <a:endParaRPr lang="en-US"/>
           </a:p>
@@ -3549,7 +3645,7 @@
           <a:p>
             <a:fld id="{B01F9CA3-105E-4857-9057-6DB6197DA786}" type="datetimeFigureOut">
               <a:rPr lang="en-US" smtClean="0"/>
-              <a:t>10/04/16</a:t>
+              <a:t>18/04/16</a:t>
             </a:fld>
             <a:endParaRPr lang="en-US"/>
           </a:p>
@@ -3718,7 +3814,7 @@
           <a:p>
             <a:fld id="{B01F9CA3-105E-4857-9057-6DB6197DA786}" type="datetimeFigureOut">
               <a:rPr lang="en-US" smtClean="0"/>
-              <a:t>10/04/16</a:t>
+              <a:t>18/04/16</a:t>
             </a:fld>
             <a:endParaRPr lang="en-US"/>
           </a:p>
@@ -3960,7 +4056,7 @@
           <a:p>
             <a:fld id="{B01F9CA3-105E-4857-9057-6DB6197DA786}" type="datetimeFigureOut">
               <a:rPr lang="en-US" smtClean="0"/>
-              <a:t>10/04/16</a:t>
+              <a:t>18/04/16</a:t>
             </a:fld>
             <a:endParaRPr lang="en-US"/>
           </a:p>
@@ -4283,7 +4379,7 @@
           <a:p>
             <a:fld id="{B01F9CA3-105E-4857-9057-6DB6197DA786}" type="datetimeFigureOut">
               <a:rPr lang="en-US" smtClean="0"/>
-              <a:t>10/04/16</a:t>
+              <a:t>18/04/16</a:t>
             </a:fld>
             <a:endParaRPr lang="en-US"/>
           </a:p>
@@ -4581,7 +4677,7 @@
           <a:p>
             <a:fld id="{B01F9CA3-105E-4857-9057-6DB6197DA786}" type="datetimeFigureOut">
               <a:rPr lang="en-US" smtClean="0"/>
-              <a:t>10/04/16</a:t>
+              <a:t>18/04/16</a:t>
             </a:fld>
             <a:endParaRPr lang="en-US"/>
           </a:p>
@@ -5037,7 +5133,7 @@
           <a:p>
             <a:fld id="{B01F9CA3-105E-4857-9057-6DB6197DA786}" type="datetimeFigureOut">
               <a:rPr lang="en-US" smtClean="0"/>
-              <a:t>10/04/16</a:t>
+              <a:t>18/04/16</a:t>
             </a:fld>
             <a:endParaRPr lang="en-US"/>
           </a:p>
@@ -5150,7 +5246,7 @@
           <a:p>
             <a:fld id="{B01F9CA3-105E-4857-9057-6DB6197DA786}" type="datetimeFigureOut">
               <a:rPr lang="en-US" smtClean="0"/>
-              <a:t>10/04/16</a:t>
+              <a:t>18/04/16</a:t>
             </a:fld>
             <a:endParaRPr lang="en-US"/>
           </a:p>
@@ -5240,7 +5336,7 @@
           <a:p>
             <a:fld id="{B01F9CA3-105E-4857-9057-6DB6197DA786}" type="datetimeFigureOut">
               <a:rPr lang="en-US" smtClean="0"/>
-              <a:t>10/04/16</a:t>
+              <a:t>18/04/16</a:t>
             </a:fld>
             <a:endParaRPr lang="en-US"/>
           </a:p>
@@ -5522,7 +5618,7 @@
           <a:p>
             <a:fld id="{B01F9CA3-105E-4857-9057-6DB6197DA786}" type="datetimeFigureOut">
               <a:rPr lang="en-US" smtClean="0"/>
-              <a:t>10/04/16</a:t>
+              <a:t>18/04/16</a:t>
             </a:fld>
             <a:endParaRPr lang="en-US"/>
           </a:p>
@@ -5728,7 +5824,7 @@
           <a:p>
             <a:fld id="{B01F9CA3-105E-4857-9057-6DB6197DA786}" type="datetimeFigureOut">
               <a:rPr lang="en-US" smtClean="0"/>
-              <a:t>10/04/16</a:t>
+              <a:t>18/04/16</a:t>
             </a:fld>
             <a:endParaRPr lang="en-US"/>
           </a:p>
@@ -16026,7 +16122,7 @@
           <p:nvPr/>
         </p:nvPicPr>
         <p:blipFill>
-          <a:blip r:embed="rId2" cstate="email">
+          <a:blip r:embed="rId3" cstate="email">
             <a:extLst>
               <a:ext uri="{28A0092B-C50C-407E-A947-70E740481C1C}">
                 <a14:useLocalDpi xmlns:a14="http://schemas.microsoft.com/office/drawing/2010/main" val="0"/>

</xml_diff>